<commit_message>
update Ch2 & Ch3 ppt
</commit_message>
<xml_diff>
--- a/Ch1/Ch1-basic.pptx
+++ b/Ch1/Ch1-basic.pptx
@@ -308,7 +308,7 @@
           <a:p>
             <a:fld id="{5CA1DE25-5FDD-4627-8F1B-8C59CC04B9FE}" type="datetimeFigureOut">
               <a:rPr lang="zh-TW" altLang="en-US" smtClean="0"/>
-              <a:t>2022/11/15</a:t>
+              <a:t>2022/11/17</a:t>
             </a:fld>
             <a:endParaRPr lang="zh-TW" altLang="en-US"/>
           </a:p>
@@ -621,35 +621,7 @@
           <a:p>
             <a:r>
               <a:rPr lang="zh-TW" altLang="en-US" dirty="0"/>
-              <a:t>第一件要講的是</a:t>
-            </a:r>
-            <a:r>
-              <a:rPr lang="en-US" altLang="zh-TW" dirty="0"/>
-              <a:t>915</a:t>
-            </a:r>
-            <a:r>
-              <a:rPr lang="zh-TW" altLang="en-US" dirty="0"/>
-              <a:t>給的</a:t>
-            </a:r>
-            <a:r>
-              <a:rPr lang="en-US" altLang="zh-TW" dirty="0"/>
-              <a:t>c/</a:t>
-            </a:r>
-            <a:r>
-              <a:rPr lang="en-US" altLang="zh-TW" dirty="0" err="1"/>
-              <a:t>c++</a:t>
-            </a:r>
-            <a:r>
-              <a:rPr lang="zh-TW" altLang="en-US" dirty="0"/>
-              <a:t> </a:t>
-            </a:r>
-            <a:r>
-              <a:rPr lang="en-US" altLang="zh-TW" dirty="0"/>
-              <a:t>IDE</a:t>
-            </a:r>
-            <a:r>
-              <a:rPr lang="zh-TW" altLang="en-US" dirty="0"/>
-              <a:t>。</a:t>
+              <a:t>感謝這麼多同學參加這次的課程</a:t>
             </a:r>
           </a:p>
         </p:txBody>
@@ -671,7 +643,7 @@
           <a:p>
             <a:fld id="{87ADF86C-EF33-4B2D-AB8D-9458098BBA93}" type="slidenum">
               <a:rPr lang="zh-TW" altLang="en-US" smtClean="0"/>
-              <a:t>5</a:t>
+              <a:t>1</a:t>
             </a:fld>
             <a:endParaRPr lang="zh-TW" altLang="en-US"/>
           </a:p>
@@ -680,7 +652,7 @@
     </p:spTree>
     <p:extLst>
       <p:ext uri="{BB962C8B-B14F-4D97-AF65-F5344CB8AC3E}">
-        <p14:creationId xmlns:p14="http://schemas.microsoft.com/office/powerpoint/2010/main" val="2391434028"/>
+        <p14:creationId xmlns:p14="http://schemas.microsoft.com/office/powerpoint/2010/main" val="1091838289"/>
       </p:ext>
     </p:extLst>
   </p:cSld>
@@ -736,8 +708,13 @@
           <a:p>
             <a:r>
               <a:rPr lang="zh-TW" altLang="en-US" dirty="0"/>
-              <a:t>程式演示</a:t>
-            </a:r>
+              <a:t>前言結束了，開始進入正題，</a:t>
+            </a:r>
+            <a:r>
+              <a:rPr lang="en-US" altLang="zh-TW" dirty="0"/>
+              <a:t>IO</a:t>
+            </a:r>
+            <a:endParaRPr lang="zh-TW" altLang="en-US" dirty="0"/>
           </a:p>
         </p:txBody>
       </p:sp>
@@ -758,7 +735,7 @@
           <a:p>
             <a:fld id="{87ADF86C-EF33-4B2D-AB8D-9458098BBA93}" type="slidenum">
               <a:rPr lang="zh-TW" altLang="en-US" smtClean="0"/>
-              <a:t>22</a:t>
+              <a:t>11</a:t>
             </a:fld>
             <a:endParaRPr lang="zh-TW" altLang="en-US"/>
           </a:p>
@@ -767,7 +744,7 @@
     </p:spTree>
     <p:extLst>
       <p:ext uri="{BB962C8B-B14F-4D97-AF65-F5344CB8AC3E}">
-        <p14:creationId xmlns:p14="http://schemas.microsoft.com/office/powerpoint/2010/main" val="3306528335"/>
+        <p14:creationId xmlns:p14="http://schemas.microsoft.com/office/powerpoint/2010/main" val="181460422"/>
       </p:ext>
     </p:extLst>
   </p:cSld>
@@ -821,7 +798,89 @@
           <a:bodyPr/>
           <a:lstStyle/>
           <a:p>
-            <a:endParaRPr lang="zh-TW" altLang="en-US" dirty="0"/>
+            <a:r>
+              <a:rPr lang="en-US" altLang="zh-TW" dirty="0"/>
+              <a:t>[]</a:t>
+            </a:r>
+            <a:r>
+              <a:rPr lang="zh-TW" altLang="en-US" dirty="0"/>
+              <a:t>是吃什麼字元，比如</a:t>
+            </a:r>
+            <a:r>
+              <a:rPr lang="en-US" altLang="zh-TW" dirty="0"/>
+              <a:t>%[</a:t>
+            </a:r>
+            <a:r>
+              <a:rPr lang="en-US" altLang="zh-TW" dirty="0" err="1"/>
+              <a:t>abc</a:t>
+            </a:r>
+            <a:r>
+              <a:rPr lang="en-US" altLang="zh-TW" dirty="0"/>
+              <a:t>]s</a:t>
+            </a:r>
+            <a:r>
+              <a:rPr lang="zh-TW" altLang="en-US" dirty="0"/>
+              <a:t>就只吃</a:t>
+            </a:r>
+            <a:r>
+              <a:rPr lang="en-US" altLang="zh-TW" dirty="0" err="1"/>
+              <a:t>abc</a:t>
+            </a:r>
+            <a:r>
+              <a:rPr lang="zh-TW" altLang="en-US" dirty="0"/>
+              <a:t>這三種字元，</a:t>
+            </a:r>
+            <a:r>
+              <a:rPr lang="en-US" altLang="zh-TW" dirty="0"/>
+              <a:t>%[0-9]</a:t>
+            </a:r>
+            <a:r>
+              <a:rPr lang="zh-TW" altLang="en-US" dirty="0"/>
+              <a:t>就只吃數字。</a:t>
+            </a:r>
+            <a:endParaRPr lang="en-US" altLang="zh-TW" dirty="0"/>
+          </a:p>
+          <a:p>
+            <a:r>
+              <a:rPr lang="en-US" altLang="zh-TW" dirty="0"/>
+              <a:t>[^]</a:t>
+            </a:r>
+            <a:r>
+              <a:rPr lang="zh-TW" altLang="en-US" dirty="0"/>
+              <a:t>是不吃甚麼字元，比如</a:t>
+            </a:r>
+            <a:r>
+              <a:rPr lang="en-US" altLang="zh-TW" dirty="0"/>
+              <a:t>%[^\n]s</a:t>
+            </a:r>
+            <a:r>
+              <a:rPr lang="zh-TW" altLang="en-US" dirty="0"/>
+              <a:t>就是除了</a:t>
+            </a:r>
+            <a:r>
+              <a:rPr lang="en-US" altLang="zh-TW" dirty="0"/>
+              <a:t>’\n’</a:t>
+            </a:r>
+            <a:r>
+              <a:rPr lang="zh-TW" altLang="en-US" dirty="0"/>
+              <a:t>其他都吃，</a:t>
+            </a:r>
+            <a:r>
+              <a:rPr lang="en-US" altLang="zh-TW" dirty="0"/>
+              <a:t>%[^0-9]s</a:t>
+            </a:r>
+            <a:r>
+              <a:rPr lang="zh-TW" altLang="en-US" dirty="0"/>
+              <a:t>就是除了數字其他都吃，</a:t>
+            </a:r>
+            <a:r>
+              <a:rPr lang="en-US" altLang="zh-TW" dirty="0"/>
+              <a:t>%[^a-z]s</a:t>
+            </a:r>
+            <a:r>
+              <a:rPr lang="zh-TW" altLang="en-US" dirty="0"/>
+              <a:t>就是除了小寫字母其他都吃。</a:t>
+            </a:r>
           </a:p>
         </p:txBody>
       </p:sp>
@@ -842,7 +901,7 @@
           <a:p>
             <a:fld id="{87ADF86C-EF33-4B2D-AB8D-9458098BBA93}" type="slidenum">
               <a:rPr lang="zh-TW" altLang="en-US" smtClean="0"/>
-              <a:t>23</a:t>
+              <a:t>14</a:t>
             </a:fld>
             <a:endParaRPr lang="zh-TW" altLang="en-US"/>
           </a:p>
@@ -851,7 +910,7 @@
     </p:spTree>
     <p:extLst>
       <p:ext uri="{BB962C8B-B14F-4D97-AF65-F5344CB8AC3E}">
-        <p14:creationId xmlns:p14="http://schemas.microsoft.com/office/powerpoint/2010/main" val="1013186740"/>
+        <p14:creationId xmlns:p14="http://schemas.microsoft.com/office/powerpoint/2010/main" val="665931322"/>
       </p:ext>
     </p:extLst>
   </p:cSld>
@@ -907,83 +966,18 @@
           <a:p>
             <a:r>
               <a:rPr lang="zh-TW" altLang="en-US" dirty="0"/>
-              <a:t>為什麼</a:t>
-            </a:r>
-            <a:r>
-              <a:rPr lang="en-US" altLang="zh-TW" dirty="0"/>
-              <a:t>~EOF=0</a:t>
-            </a:r>
+              <a:t>第一個迴圈處理一行的輸入，第二個處理那行輸入。</a:t>
+            </a:r>
+            <a:endParaRPr lang="en-US" altLang="zh-TW" dirty="0"/>
+          </a:p>
+          <a:p>
             <a:r>
               <a:rPr lang="zh-TW" altLang="en-US" dirty="0"/>
-              <a:t>，看</a:t>
-            </a:r>
-            <a:r>
-              <a:rPr lang="en-US" altLang="zh-TW" dirty="0"/>
-              <a:t>include header</a:t>
-            </a:r>
-            <a:r>
-              <a:rPr lang="zh-TW" altLang="en-US" dirty="0"/>
-              <a:t>。</a:t>
-            </a:r>
-            <a:r>
-              <a:rPr lang="en-US" altLang="zh-TW" dirty="0"/>
-              <a:t>EOF</a:t>
-            </a:r>
-            <a:r>
-              <a:rPr lang="zh-TW" altLang="en-US" dirty="0"/>
-              <a:t>的值其實是廠商們自己</a:t>
-            </a:r>
-            <a:r>
-              <a:rPr lang="en-US" altLang="zh-TW" dirty="0"/>
-              <a:t>define</a:t>
-            </a:r>
-            <a:r>
-              <a:rPr lang="zh-TW" altLang="en-US" dirty="0"/>
-              <a:t>的。</a:t>
-            </a:r>
-            <a:r>
-              <a:rPr lang="en-US" altLang="zh-TW" dirty="0"/>
-              <a:t>ANSI</a:t>
-            </a:r>
-            <a:r>
-              <a:rPr lang="zh-TW" altLang="en-US" dirty="0"/>
-              <a:t>制定</a:t>
-            </a:r>
-            <a:r>
-              <a:rPr lang="en-US" altLang="zh-TW" dirty="0"/>
-              <a:t>C</a:t>
-            </a:r>
-            <a:r>
-              <a:rPr lang="zh-TW" altLang="en-US" dirty="0"/>
-              <a:t>標準</a:t>
-            </a:r>
-            <a:r>
-              <a:rPr lang="en-US" altLang="zh-TW" dirty="0"/>
-              <a:t>-&gt;</a:t>
-            </a:r>
-            <a:r>
-              <a:rPr lang="zh-TW" altLang="en-US" dirty="0"/>
-              <a:t>各組織</a:t>
-            </a:r>
-            <a:r>
-              <a:rPr lang="en-US" altLang="zh-TW" dirty="0"/>
-              <a:t>/</a:t>
-            </a:r>
-            <a:r>
-              <a:rPr lang="zh-TW" altLang="en-US" dirty="0"/>
-              <a:t>個人依據標準撰寫</a:t>
-            </a:r>
-            <a:r>
-              <a:rPr lang="en-US" altLang="zh-TW" dirty="0"/>
-              <a:t>C compiler, e.g., gun </a:t>
+              <a:t>特別講一下</a:t>
             </a:r>
             <a:r>
               <a:rPr lang="en-US" altLang="zh-TW" dirty="0" err="1"/>
-              <a:t>gcc</a:t>
-            </a:r>
-            <a:r>
-              <a:rPr lang="en-US" altLang="zh-TW" dirty="0"/>
-              <a:t>, MSVC, clang, turbo c</a:t>
+              <a:t>s+offset</a:t>
             </a:r>
             <a:endParaRPr lang="zh-TW" altLang="en-US" dirty="0"/>
           </a:p>
@@ -1006,7 +1000,7 @@
           <a:p>
             <a:fld id="{87ADF86C-EF33-4B2D-AB8D-9458098BBA93}" type="slidenum">
               <a:rPr lang="zh-TW" altLang="en-US" smtClean="0"/>
-              <a:t>24</a:t>
+              <a:t>17</a:t>
             </a:fld>
             <a:endParaRPr lang="zh-TW" altLang="en-US"/>
           </a:p>
@@ -1015,7 +1009,7 @@
     </p:spTree>
     <p:extLst>
       <p:ext uri="{BB962C8B-B14F-4D97-AF65-F5344CB8AC3E}">
-        <p14:creationId xmlns:p14="http://schemas.microsoft.com/office/powerpoint/2010/main" val="1188325278"/>
+        <p14:creationId xmlns:p14="http://schemas.microsoft.com/office/powerpoint/2010/main" val="707070701"/>
       </p:ext>
     </p:extLst>
   </p:cSld>
@@ -1070,9 +1064,18 @@
           <a:lstStyle/>
           <a:p>
             <a:r>
+              <a:rPr lang="en-US" altLang="zh-TW" dirty="0"/>
+              <a:t>(</a:t>
+            </a:r>
+            <a:r>
               <a:rPr lang="zh-TW" altLang="en-US" dirty="0"/>
-              <a:t>程式演示</a:t>
-            </a:r>
+              <a:t>依時間程式講解</a:t>
+            </a:r>
+            <a:r>
+              <a:rPr lang="en-US" altLang="zh-TW" dirty="0"/>
+              <a:t>)</a:t>
+            </a:r>
+            <a:endParaRPr lang="zh-TW" altLang="en-US" dirty="0"/>
           </a:p>
         </p:txBody>
       </p:sp>
@@ -1093,7 +1096,7 @@
           <a:p>
             <a:fld id="{87ADF86C-EF33-4B2D-AB8D-9458098BBA93}" type="slidenum">
               <a:rPr lang="zh-TW" altLang="en-US" smtClean="0"/>
-              <a:t>25</a:t>
+              <a:t>19</a:t>
             </a:fld>
             <a:endParaRPr lang="zh-TW" altLang="en-US"/>
           </a:p>
@@ -1102,7 +1105,7 @@
     </p:spTree>
     <p:extLst>
       <p:ext uri="{BB962C8B-B14F-4D97-AF65-F5344CB8AC3E}">
-        <p14:creationId xmlns:p14="http://schemas.microsoft.com/office/powerpoint/2010/main" val="549212782"/>
+        <p14:creationId xmlns:p14="http://schemas.microsoft.com/office/powerpoint/2010/main" val="1468201492"/>
       </p:ext>
     </p:extLst>
   </p:cSld>
@@ -1157,12 +1160,16 @@
           <a:lstStyle/>
           <a:p>
             <a:r>
+              <a:rPr lang="en-US" altLang="zh-TW" dirty="0"/>
+              <a:t>(</a:t>
+            </a:r>
+            <a:r>
               <a:rPr lang="zh-TW" altLang="en-US" dirty="0"/>
-              <a:t>示範怎麼</a:t>
+              <a:t>依時間程式講解</a:t>
             </a:r>
             <a:r>
               <a:rPr lang="en-US" altLang="zh-TW" dirty="0"/>
-              <a:t>call C preprocessor</a:t>
+              <a:t>)</a:t>
             </a:r>
             <a:endParaRPr lang="zh-TW" altLang="en-US" dirty="0"/>
           </a:p>
@@ -1185,7 +1192,7 @@
           <a:p>
             <a:fld id="{87ADF86C-EF33-4B2D-AB8D-9458098BBA93}" type="slidenum">
               <a:rPr lang="zh-TW" altLang="en-US" smtClean="0"/>
-              <a:t>29</a:t>
+              <a:t>20</a:t>
             </a:fld>
             <a:endParaRPr lang="zh-TW" altLang="en-US"/>
           </a:p>
@@ -1194,7 +1201,7 @@
     </p:spTree>
     <p:extLst>
       <p:ext uri="{BB962C8B-B14F-4D97-AF65-F5344CB8AC3E}">
-        <p14:creationId xmlns:p14="http://schemas.microsoft.com/office/powerpoint/2010/main" val="3133688329"/>
+        <p14:creationId xmlns:p14="http://schemas.microsoft.com/office/powerpoint/2010/main" val="263008912"/>
       </p:ext>
     </p:extLst>
   </p:cSld>
@@ -1248,10 +1255,38 @@
           <a:bodyPr/>
           <a:lstStyle/>
           <a:p>
+            <a:pPr marL="0" marR="0" lvl="0" indent="0" algn="l" defTabSz="914400" rtl="0" eaLnBrk="1" fontAlgn="auto" latinLnBrk="0" hangingPunct="1">
+              <a:lnSpc>
+                <a:spcPct val="100000"/>
+              </a:lnSpc>
+              <a:spcBef>
+                <a:spcPts val="0"/>
+              </a:spcBef>
+              <a:spcAft>
+                <a:spcPts val="0"/>
+              </a:spcAft>
+              <a:buClrTx/>
+              <a:buSzTx/>
+              <a:buFontTx/>
+              <a:buNone/>
+              <a:tabLst/>
+              <a:defRPr/>
+            </a:pPr>
             <a:r>
               <a:rPr lang="en-US" altLang="zh-TW" dirty="0"/>
-              <a:t>Directives=instruction</a:t>
-            </a:r>
+              <a:t>(</a:t>
+            </a:r>
+            <a:r>
+              <a:rPr lang="zh-TW" altLang="en-US" dirty="0"/>
+              <a:t>依時間程式講解</a:t>
+            </a:r>
+            <a:r>
+              <a:rPr lang="en-US" altLang="zh-TW" dirty="0"/>
+              <a:t>)</a:t>
+            </a:r>
+            <a:endParaRPr lang="zh-TW" altLang="en-US" dirty="0"/>
+          </a:p>
+          <a:p>
             <a:endParaRPr lang="zh-TW" altLang="en-US" dirty="0"/>
           </a:p>
         </p:txBody>
@@ -1273,7 +1308,7 @@
           <a:p>
             <a:fld id="{87ADF86C-EF33-4B2D-AB8D-9458098BBA93}" type="slidenum">
               <a:rPr lang="zh-TW" altLang="en-US" smtClean="0"/>
-              <a:t>30</a:t>
+              <a:t>21</a:t>
             </a:fld>
             <a:endParaRPr lang="zh-TW" altLang="en-US"/>
           </a:p>
@@ -1282,7 +1317,7 @@
     </p:spTree>
     <p:extLst>
       <p:ext uri="{BB962C8B-B14F-4D97-AF65-F5344CB8AC3E}">
-        <p14:creationId xmlns:p14="http://schemas.microsoft.com/office/powerpoint/2010/main" val="3461894708"/>
+        <p14:creationId xmlns:p14="http://schemas.microsoft.com/office/powerpoint/2010/main" val="1989071583"/>
       </p:ext>
     </p:extLst>
   </p:cSld>
@@ -1338,13 +1373,8 @@
           <a:p>
             <a:r>
               <a:rPr lang="zh-TW" altLang="en-US" dirty="0"/>
-              <a:t>稍微講一下</a:t>
-            </a:r>
-            <a:r>
-              <a:rPr lang="en-US" altLang="zh-TW" dirty="0"/>
-              <a:t>include guard</a:t>
-            </a:r>
-            <a:endParaRPr lang="zh-TW" altLang="en-US" dirty="0"/>
+              <a:t>程式演示</a:t>
+            </a:r>
           </a:p>
         </p:txBody>
       </p:sp>
@@ -1365,7 +1395,7 @@
           <a:p>
             <a:fld id="{87ADF86C-EF33-4B2D-AB8D-9458098BBA93}" type="slidenum">
               <a:rPr lang="zh-TW" altLang="en-US" smtClean="0"/>
-              <a:t>31</a:t>
+              <a:t>22</a:t>
             </a:fld>
             <a:endParaRPr lang="zh-TW" altLang="en-US"/>
           </a:p>
@@ -1374,7 +1404,7 @@
     </p:spTree>
     <p:extLst>
       <p:ext uri="{BB962C8B-B14F-4D97-AF65-F5344CB8AC3E}">
-        <p14:creationId xmlns:p14="http://schemas.microsoft.com/office/powerpoint/2010/main" val="1037955547"/>
+        <p14:creationId xmlns:p14="http://schemas.microsoft.com/office/powerpoint/2010/main" val="3306528335"/>
       </p:ext>
     </p:extLst>
   </p:cSld>
@@ -1428,34 +1458,6 @@
           <a:bodyPr/>
           <a:lstStyle/>
           <a:p>
-            <a:r>
-              <a:rPr lang="en-US" altLang="zh-TW" dirty="0"/>
-              <a:t>__</a:t>
-            </a:r>
-            <a:r>
-              <a:rPr lang="en-US" altLang="zh-TW" dirty="0" err="1"/>
-              <a:t>typeof</a:t>
-            </a:r>
-            <a:r>
-              <a:rPr lang="en-US" altLang="zh-TW" dirty="0"/>
-              <a:t>__ -&gt; </a:t>
-            </a:r>
-            <a:r>
-              <a:rPr lang="zh-TW" altLang="en-US" dirty="0"/>
-              <a:t>賦值擴展 </a:t>
-            </a:r>
-            <a:r>
-              <a:rPr lang="en-US" altLang="zh-TW" dirty="0"/>
-              <a:t>-&gt; </a:t>
-            </a:r>
-            <a:r>
-              <a:rPr lang="zh-TW" altLang="en-US" dirty="0"/>
-              <a:t>既然看起來像函式，</a:t>
-            </a:r>
-            <a:r>
-              <a:rPr lang="en-US" altLang="zh-TW" dirty="0"/>
-              <a:t>why use macro?</a:t>
-            </a:r>
             <a:endParaRPr lang="zh-TW" altLang="en-US" dirty="0"/>
           </a:p>
         </p:txBody>
@@ -1477,7 +1479,7 @@
           <a:p>
             <a:fld id="{87ADF86C-EF33-4B2D-AB8D-9458098BBA93}" type="slidenum">
               <a:rPr lang="zh-TW" altLang="en-US" smtClean="0"/>
-              <a:t>48</a:t>
+              <a:t>23</a:t>
             </a:fld>
             <a:endParaRPr lang="zh-TW" altLang="en-US"/>
           </a:p>
@@ -1486,7 +1488,7 @@
     </p:spTree>
     <p:extLst>
       <p:ext uri="{BB962C8B-B14F-4D97-AF65-F5344CB8AC3E}">
-        <p14:creationId xmlns:p14="http://schemas.microsoft.com/office/powerpoint/2010/main" val="1719994845"/>
+        <p14:creationId xmlns:p14="http://schemas.microsoft.com/office/powerpoint/2010/main" val="1013186740"/>
       </p:ext>
     </p:extLst>
   </p:cSld>
@@ -1542,16 +1544,85 @@
           <a:p>
             <a:r>
               <a:rPr lang="zh-TW" altLang="en-US" dirty="0"/>
-              <a:t>這裡是講</a:t>
+              <a:t>為什麼</a:t>
             </a:r>
             <a:r>
               <a:rPr lang="en-US" altLang="zh-TW" dirty="0"/>
-              <a:t>do…while</a:t>
+              <a:t>~EOF=0</a:t>
             </a:r>
             <a:r>
               <a:rPr lang="zh-TW" altLang="en-US" dirty="0"/>
-              <a:t>的用途，不是範例</a:t>
-            </a:r>
+              <a:t>，看</a:t>
+            </a:r>
+            <a:r>
+              <a:rPr lang="en-US" altLang="zh-TW" dirty="0"/>
+              <a:t>include header</a:t>
+            </a:r>
+            <a:r>
+              <a:rPr lang="zh-TW" altLang="en-US" dirty="0"/>
+              <a:t>。</a:t>
+            </a:r>
+            <a:r>
+              <a:rPr lang="en-US" altLang="zh-TW" dirty="0"/>
+              <a:t>EOF</a:t>
+            </a:r>
+            <a:r>
+              <a:rPr lang="zh-TW" altLang="en-US" dirty="0"/>
+              <a:t>的值其實是廠商們自己</a:t>
+            </a:r>
+            <a:r>
+              <a:rPr lang="en-US" altLang="zh-TW" dirty="0"/>
+              <a:t>define</a:t>
+            </a:r>
+            <a:r>
+              <a:rPr lang="zh-TW" altLang="en-US" dirty="0"/>
+              <a:t>的。</a:t>
+            </a:r>
+            <a:r>
+              <a:rPr lang="en-US" altLang="zh-TW" dirty="0"/>
+              <a:t>ANSI</a:t>
+            </a:r>
+            <a:r>
+              <a:rPr lang="zh-TW" altLang="en-US" dirty="0"/>
+              <a:t>制定</a:t>
+            </a:r>
+            <a:r>
+              <a:rPr lang="en-US" altLang="zh-TW" dirty="0"/>
+              <a:t>C</a:t>
+            </a:r>
+            <a:r>
+              <a:rPr lang="zh-TW" altLang="en-US" dirty="0"/>
+              <a:t>標準</a:t>
+            </a:r>
+            <a:r>
+              <a:rPr lang="en-US" altLang="zh-TW" dirty="0"/>
+              <a:t>-&gt;</a:t>
+            </a:r>
+            <a:r>
+              <a:rPr lang="zh-TW" altLang="en-US" dirty="0"/>
+              <a:t>各組織</a:t>
+            </a:r>
+            <a:r>
+              <a:rPr lang="en-US" altLang="zh-TW" dirty="0"/>
+              <a:t>/</a:t>
+            </a:r>
+            <a:r>
+              <a:rPr lang="zh-TW" altLang="en-US" dirty="0"/>
+              <a:t>個人依據標準撰寫</a:t>
+            </a:r>
+            <a:r>
+              <a:rPr lang="en-US" altLang="zh-TW" dirty="0"/>
+              <a:t>C compiler, e.g., </a:t>
+            </a:r>
+            <a:r>
+              <a:rPr lang="en-US" altLang="zh-TW" dirty="0" err="1"/>
+              <a:t>gcc</a:t>
+            </a:r>
+            <a:r>
+              <a:rPr lang="en-US" altLang="zh-TW" dirty="0"/>
+              <a:t>, MSVC, clang, turbo c</a:t>
+            </a:r>
+            <a:endParaRPr lang="zh-TW" altLang="en-US" dirty="0"/>
           </a:p>
         </p:txBody>
       </p:sp>
@@ -1572,7 +1643,7 @@
           <a:p>
             <a:fld id="{87ADF86C-EF33-4B2D-AB8D-9458098BBA93}" type="slidenum">
               <a:rPr lang="zh-TW" altLang="en-US" smtClean="0"/>
-              <a:t>49</a:t>
+              <a:t>24</a:t>
             </a:fld>
             <a:endParaRPr lang="zh-TW" altLang="en-US"/>
           </a:p>
@@ -1581,7 +1652,7 @@
     </p:spTree>
     <p:extLst>
       <p:ext uri="{BB962C8B-B14F-4D97-AF65-F5344CB8AC3E}">
-        <p14:creationId xmlns:p14="http://schemas.microsoft.com/office/powerpoint/2010/main" val="3393505391"/>
+        <p14:creationId xmlns:p14="http://schemas.microsoft.com/office/powerpoint/2010/main" val="1188325278"/>
       </p:ext>
     </p:extLst>
   </p:cSld>
@@ -1637,11 +1708,7 @@
           <a:p>
             <a:r>
               <a:rPr lang="zh-TW" altLang="en-US" dirty="0"/>
-              <a:t>如果有相同的身高</a:t>
-            </a:r>
-            <a:r>
-              <a:rPr lang="en-US" altLang="zh-TW" dirty="0"/>
-              <a:t>?</a:t>
+              <a:t>程式演示</a:t>
             </a:r>
           </a:p>
         </p:txBody>
@@ -1663,7 +1730,7 @@
           <a:p>
             <a:fld id="{87ADF86C-EF33-4B2D-AB8D-9458098BBA93}" type="slidenum">
               <a:rPr lang="zh-TW" altLang="en-US" smtClean="0"/>
-              <a:t>68</a:t>
+              <a:t>25</a:t>
             </a:fld>
             <a:endParaRPr lang="zh-TW" altLang="en-US"/>
           </a:p>
@@ -1672,7 +1739,7 @@
     </p:spTree>
     <p:extLst>
       <p:ext uri="{BB962C8B-B14F-4D97-AF65-F5344CB8AC3E}">
-        <p14:creationId xmlns:p14="http://schemas.microsoft.com/office/powerpoint/2010/main" val="1004682607"/>
+        <p14:creationId xmlns:p14="http://schemas.microsoft.com/office/powerpoint/2010/main" val="549212782"/>
       </p:ext>
     </p:extLst>
   </p:cSld>
@@ -1727,41 +1794,33 @@
           <a:lstStyle/>
           <a:p>
             <a:r>
+              <a:rPr lang="zh-TW" altLang="en-US" dirty="0"/>
+              <a:t>開這堂課的目的是為了幫助同學提升基本的</a:t>
+            </a:r>
+            <a:r>
               <a:rPr lang="en-US" altLang="zh-TW" dirty="0"/>
-              <a:t>IDE</a:t>
+              <a:t>C</a:t>
             </a:r>
             <a:r>
               <a:rPr lang="zh-TW" altLang="en-US" dirty="0"/>
-              <a:t>就是把編輯器、檔案管理、編譯器、</a:t>
+              <a:t>語言能力，要很了解</a:t>
             </a:r>
             <a:r>
               <a:rPr lang="en-US" altLang="zh-TW" dirty="0"/>
-              <a:t>debugger</a:t>
+              <a:t>C</a:t>
             </a:r>
             <a:r>
               <a:rPr lang="zh-TW" altLang="en-US" dirty="0"/>
-              <a:t>、執行環境全部整合在一起的軟體。</a:t>
-            </a:r>
-            <a:endParaRPr lang="en-US" altLang="zh-TW" dirty="0"/>
-          </a:p>
-          <a:p>
+              <a:t>語言的話，其實需要很多先備知識，我當時在學習的過程中，很多東西都不了解，花了很多時間去找資料，而且找了很多資料才學會</a:t>
+            </a:r>
             <a:r>
               <a:rPr lang="en-US" altLang="zh-TW" dirty="0"/>
-              <a:t>(Dev </a:t>
-            </a:r>
-            <a:r>
-              <a:rPr lang="en-US" altLang="zh-TW" dirty="0" err="1"/>
-              <a:t>c++</a:t>
+              <a:t>C</a:t>
             </a:r>
             <a:r>
               <a:rPr lang="zh-TW" altLang="en-US" dirty="0"/>
-              <a:t>演示。</a:t>
-            </a:r>
-            <a:r>
-              <a:rPr lang="en-US" altLang="zh-TW" dirty="0"/>
-              <a:t>)</a:t>
-            </a:r>
-            <a:endParaRPr lang="zh-TW" altLang="en-US" dirty="0"/>
+              <a:t>，所以我希望我可以幫助同學，少走一點我以前走過的路。</a:t>
+            </a:r>
           </a:p>
         </p:txBody>
       </p:sp>
@@ -1782,7 +1841,7 @@
           <a:p>
             <a:fld id="{87ADF86C-EF33-4B2D-AB8D-9458098BBA93}" type="slidenum">
               <a:rPr lang="zh-TW" altLang="en-US" smtClean="0"/>
-              <a:t>6</a:t>
+              <a:t>2</a:t>
             </a:fld>
             <a:endParaRPr lang="zh-TW" altLang="en-US"/>
           </a:p>
@@ -1791,7 +1850,577 @@
     </p:spTree>
     <p:extLst>
       <p:ext uri="{BB962C8B-B14F-4D97-AF65-F5344CB8AC3E}">
-        <p14:creationId xmlns:p14="http://schemas.microsoft.com/office/powerpoint/2010/main" val="3895625923"/>
+        <p14:creationId xmlns:p14="http://schemas.microsoft.com/office/powerpoint/2010/main" val="614588992"/>
+      </p:ext>
+    </p:extLst>
+  </p:cSld>
+  <p:clrMapOvr>
+    <a:masterClrMapping/>
+  </p:clrMapOvr>
+</p:notes>
+</file>
+
+<file path=ppt/notesSlides/notesSlide20.xml><?xml version="1.0" encoding="utf-8"?>
+<p:notes xmlns:a="http://schemas.openxmlformats.org/drawingml/2006/main" xmlns:r="http://schemas.openxmlformats.org/officeDocument/2006/relationships" xmlns:p="http://schemas.openxmlformats.org/presentationml/2006/main">
+  <p:cSld>
+    <p:spTree>
+      <p:nvGrpSpPr>
+        <p:cNvPr id="1" name=""/>
+        <p:cNvGrpSpPr/>
+        <p:nvPr/>
+      </p:nvGrpSpPr>
+      <p:grpSpPr>
+        <a:xfrm>
+          <a:off x="0" y="0"/>
+          <a:ext cx="0" cy="0"/>
+          <a:chOff x="0" y="0"/>
+          <a:chExt cx="0" cy="0"/>
+        </a:xfrm>
+      </p:grpSpPr>
+      <p:sp>
+        <p:nvSpPr>
+          <p:cNvPr id="2" name="投影片影像版面配置區 1"/>
+          <p:cNvSpPr>
+            <a:spLocks noGrp="1" noRot="1" noChangeAspect="1"/>
+          </p:cNvSpPr>
+          <p:nvPr>
+            <p:ph type="sldImg"/>
+          </p:nvPr>
+        </p:nvSpPr>
+        <p:spPr/>
+      </p:sp>
+      <p:sp>
+        <p:nvSpPr>
+          <p:cNvPr id="3" name="備忘稿版面配置區 2"/>
+          <p:cNvSpPr>
+            <a:spLocks noGrp="1"/>
+          </p:cNvSpPr>
+          <p:nvPr>
+            <p:ph type="body" idx="1"/>
+          </p:nvPr>
+        </p:nvSpPr>
+        <p:spPr/>
+        <p:txBody>
+          <a:bodyPr/>
+          <a:lstStyle/>
+          <a:p>
+            <a:r>
+              <a:rPr lang="zh-TW" altLang="en-US" dirty="0"/>
+              <a:t>示範怎麼</a:t>
+            </a:r>
+            <a:r>
+              <a:rPr lang="en-US" altLang="zh-TW" dirty="0"/>
+              <a:t>call C preprocessor</a:t>
+            </a:r>
+            <a:endParaRPr lang="zh-TW" altLang="en-US" dirty="0"/>
+          </a:p>
+        </p:txBody>
+      </p:sp>
+      <p:sp>
+        <p:nvSpPr>
+          <p:cNvPr id="4" name="投影片編號版面配置區 3"/>
+          <p:cNvSpPr>
+            <a:spLocks noGrp="1"/>
+          </p:cNvSpPr>
+          <p:nvPr>
+            <p:ph type="sldNum" sz="quarter" idx="5"/>
+          </p:nvPr>
+        </p:nvSpPr>
+        <p:spPr/>
+        <p:txBody>
+          <a:bodyPr/>
+          <a:lstStyle/>
+          <a:p>
+            <a:fld id="{87ADF86C-EF33-4B2D-AB8D-9458098BBA93}" type="slidenum">
+              <a:rPr lang="zh-TW" altLang="en-US" smtClean="0"/>
+              <a:t>29</a:t>
+            </a:fld>
+            <a:endParaRPr lang="zh-TW" altLang="en-US"/>
+          </a:p>
+        </p:txBody>
+      </p:sp>
+    </p:spTree>
+    <p:extLst>
+      <p:ext uri="{BB962C8B-B14F-4D97-AF65-F5344CB8AC3E}">
+        <p14:creationId xmlns:p14="http://schemas.microsoft.com/office/powerpoint/2010/main" val="3133688329"/>
+      </p:ext>
+    </p:extLst>
+  </p:cSld>
+  <p:clrMapOvr>
+    <a:masterClrMapping/>
+  </p:clrMapOvr>
+</p:notes>
+</file>
+
+<file path=ppt/notesSlides/notesSlide21.xml><?xml version="1.0" encoding="utf-8"?>
+<p:notes xmlns:a="http://schemas.openxmlformats.org/drawingml/2006/main" xmlns:r="http://schemas.openxmlformats.org/officeDocument/2006/relationships" xmlns:p="http://schemas.openxmlformats.org/presentationml/2006/main">
+  <p:cSld>
+    <p:spTree>
+      <p:nvGrpSpPr>
+        <p:cNvPr id="1" name=""/>
+        <p:cNvGrpSpPr/>
+        <p:nvPr/>
+      </p:nvGrpSpPr>
+      <p:grpSpPr>
+        <a:xfrm>
+          <a:off x="0" y="0"/>
+          <a:ext cx="0" cy="0"/>
+          <a:chOff x="0" y="0"/>
+          <a:chExt cx="0" cy="0"/>
+        </a:xfrm>
+      </p:grpSpPr>
+      <p:sp>
+        <p:nvSpPr>
+          <p:cNvPr id="2" name="投影片影像版面配置區 1"/>
+          <p:cNvSpPr>
+            <a:spLocks noGrp="1" noRot="1" noChangeAspect="1"/>
+          </p:cNvSpPr>
+          <p:nvPr>
+            <p:ph type="sldImg"/>
+          </p:nvPr>
+        </p:nvSpPr>
+        <p:spPr/>
+      </p:sp>
+      <p:sp>
+        <p:nvSpPr>
+          <p:cNvPr id="3" name="備忘稿版面配置區 2"/>
+          <p:cNvSpPr>
+            <a:spLocks noGrp="1"/>
+          </p:cNvSpPr>
+          <p:nvPr>
+            <p:ph type="body" idx="1"/>
+          </p:nvPr>
+        </p:nvSpPr>
+        <p:spPr/>
+        <p:txBody>
+          <a:bodyPr/>
+          <a:lstStyle/>
+          <a:p>
+            <a:r>
+              <a:rPr lang="en-US" altLang="zh-TW" dirty="0"/>
+              <a:t>Directives=instruction</a:t>
+            </a:r>
+            <a:endParaRPr lang="zh-TW" altLang="en-US" dirty="0"/>
+          </a:p>
+        </p:txBody>
+      </p:sp>
+      <p:sp>
+        <p:nvSpPr>
+          <p:cNvPr id="4" name="投影片編號版面配置區 3"/>
+          <p:cNvSpPr>
+            <a:spLocks noGrp="1"/>
+          </p:cNvSpPr>
+          <p:nvPr>
+            <p:ph type="sldNum" sz="quarter" idx="5"/>
+          </p:nvPr>
+        </p:nvSpPr>
+        <p:spPr/>
+        <p:txBody>
+          <a:bodyPr/>
+          <a:lstStyle/>
+          <a:p>
+            <a:fld id="{87ADF86C-EF33-4B2D-AB8D-9458098BBA93}" type="slidenum">
+              <a:rPr lang="zh-TW" altLang="en-US" smtClean="0"/>
+              <a:t>30</a:t>
+            </a:fld>
+            <a:endParaRPr lang="zh-TW" altLang="en-US"/>
+          </a:p>
+        </p:txBody>
+      </p:sp>
+    </p:spTree>
+    <p:extLst>
+      <p:ext uri="{BB962C8B-B14F-4D97-AF65-F5344CB8AC3E}">
+        <p14:creationId xmlns:p14="http://schemas.microsoft.com/office/powerpoint/2010/main" val="3461894708"/>
+      </p:ext>
+    </p:extLst>
+  </p:cSld>
+  <p:clrMapOvr>
+    <a:masterClrMapping/>
+  </p:clrMapOvr>
+</p:notes>
+</file>
+
+<file path=ppt/notesSlides/notesSlide22.xml><?xml version="1.0" encoding="utf-8"?>
+<p:notes xmlns:a="http://schemas.openxmlformats.org/drawingml/2006/main" xmlns:r="http://schemas.openxmlformats.org/officeDocument/2006/relationships" xmlns:p="http://schemas.openxmlformats.org/presentationml/2006/main">
+  <p:cSld>
+    <p:spTree>
+      <p:nvGrpSpPr>
+        <p:cNvPr id="1" name=""/>
+        <p:cNvGrpSpPr/>
+        <p:nvPr/>
+      </p:nvGrpSpPr>
+      <p:grpSpPr>
+        <a:xfrm>
+          <a:off x="0" y="0"/>
+          <a:ext cx="0" cy="0"/>
+          <a:chOff x="0" y="0"/>
+          <a:chExt cx="0" cy="0"/>
+        </a:xfrm>
+      </p:grpSpPr>
+      <p:sp>
+        <p:nvSpPr>
+          <p:cNvPr id="2" name="投影片影像版面配置區 1"/>
+          <p:cNvSpPr>
+            <a:spLocks noGrp="1" noRot="1" noChangeAspect="1"/>
+          </p:cNvSpPr>
+          <p:nvPr>
+            <p:ph type="sldImg"/>
+          </p:nvPr>
+        </p:nvSpPr>
+        <p:spPr/>
+      </p:sp>
+      <p:sp>
+        <p:nvSpPr>
+          <p:cNvPr id="3" name="備忘稿版面配置區 2"/>
+          <p:cNvSpPr>
+            <a:spLocks noGrp="1"/>
+          </p:cNvSpPr>
+          <p:nvPr>
+            <p:ph type="body" idx="1"/>
+          </p:nvPr>
+        </p:nvSpPr>
+        <p:spPr/>
+        <p:txBody>
+          <a:bodyPr/>
+          <a:lstStyle/>
+          <a:p>
+            <a:r>
+              <a:rPr lang="zh-TW" altLang="en-US" dirty="0"/>
+              <a:t>稍微講一下</a:t>
+            </a:r>
+            <a:r>
+              <a:rPr lang="en-US" altLang="zh-TW" dirty="0"/>
+              <a:t>include guard</a:t>
+            </a:r>
+            <a:endParaRPr lang="zh-TW" altLang="en-US" dirty="0"/>
+          </a:p>
+        </p:txBody>
+      </p:sp>
+      <p:sp>
+        <p:nvSpPr>
+          <p:cNvPr id="4" name="投影片編號版面配置區 3"/>
+          <p:cNvSpPr>
+            <a:spLocks noGrp="1"/>
+          </p:cNvSpPr>
+          <p:nvPr>
+            <p:ph type="sldNum" sz="quarter" idx="5"/>
+          </p:nvPr>
+        </p:nvSpPr>
+        <p:spPr/>
+        <p:txBody>
+          <a:bodyPr/>
+          <a:lstStyle/>
+          <a:p>
+            <a:fld id="{87ADF86C-EF33-4B2D-AB8D-9458098BBA93}" type="slidenum">
+              <a:rPr lang="zh-TW" altLang="en-US" smtClean="0"/>
+              <a:t>31</a:t>
+            </a:fld>
+            <a:endParaRPr lang="zh-TW" altLang="en-US"/>
+          </a:p>
+        </p:txBody>
+      </p:sp>
+    </p:spTree>
+    <p:extLst>
+      <p:ext uri="{BB962C8B-B14F-4D97-AF65-F5344CB8AC3E}">
+        <p14:creationId xmlns:p14="http://schemas.microsoft.com/office/powerpoint/2010/main" val="1037955547"/>
+      </p:ext>
+    </p:extLst>
+  </p:cSld>
+  <p:clrMapOvr>
+    <a:masterClrMapping/>
+  </p:clrMapOvr>
+</p:notes>
+</file>
+
+<file path=ppt/notesSlides/notesSlide23.xml><?xml version="1.0" encoding="utf-8"?>
+<p:notes xmlns:a="http://schemas.openxmlformats.org/drawingml/2006/main" xmlns:r="http://schemas.openxmlformats.org/officeDocument/2006/relationships" xmlns:p="http://schemas.openxmlformats.org/presentationml/2006/main">
+  <p:cSld>
+    <p:spTree>
+      <p:nvGrpSpPr>
+        <p:cNvPr id="1" name=""/>
+        <p:cNvGrpSpPr/>
+        <p:nvPr/>
+      </p:nvGrpSpPr>
+      <p:grpSpPr>
+        <a:xfrm>
+          <a:off x="0" y="0"/>
+          <a:ext cx="0" cy="0"/>
+          <a:chOff x="0" y="0"/>
+          <a:chExt cx="0" cy="0"/>
+        </a:xfrm>
+      </p:grpSpPr>
+      <p:sp>
+        <p:nvSpPr>
+          <p:cNvPr id="2" name="投影片影像版面配置區 1"/>
+          <p:cNvSpPr>
+            <a:spLocks noGrp="1" noRot="1" noChangeAspect="1"/>
+          </p:cNvSpPr>
+          <p:nvPr>
+            <p:ph type="sldImg"/>
+          </p:nvPr>
+        </p:nvSpPr>
+        <p:spPr/>
+      </p:sp>
+      <p:sp>
+        <p:nvSpPr>
+          <p:cNvPr id="3" name="備忘稿版面配置區 2"/>
+          <p:cNvSpPr>
+            <a:spLocks noGrp="1"/>
+          </p:cNvSpPr>
+          <p:nvPr>
+            <p:ph type="body" idx="1"/>
+          </p:nvPr>
+        </p:nvSpPr>
+        <p:spPr/>
+        <p:txBody>
+          <a:bodyPr/>
+          <a:lstStyle/>
+          <a:p>
+            <a:r>
+              <a:rPr lang="en-US" altLang="zh-TW" dirty="0"/>
+              <a:t>__</a:t>
+            </a:r>
+            <a:r>
+              <a:rPr lang="en-US" altLang="zh-TW" dirty="0" err="1"/>
+              <a:t>typeof</a:t>
+            </a:r>
+            <a:r>
+              <a:rPr lang="en-US" altLang="zh-TW" dirty="0"/>
+              <a:t>__ -&gt; </a:t>
+            </a:r>
+            <a:r>
+              <a:rPr lang="zh-TW" altLang="en-US" dirty="0"/>
+              <a:t>賦值擴展 </a:t>
+            </a:r>
+            <a:r>
+              <a:rPr lang="en-US" altLang="zh-TW" dirty="0"/>
+              <a:t>-&gt; </a:t>
+            </a:r>
+            <a:r>
+              <a:rPr lang="zh-TW" altLang="en-US" dirty="0"/>
+              <a:t>既然看起來像函式，</a:t>
+            </a:r>
+            <a:r>
+              <a:rPr lang="en-US" altLang="zh-TW" dirty="0"/>
+              <a:t>why use macro?</a:t>
+            </a:r>
+            <a:endParaRPr lang="zh-TW" altLang="en-US" dirty="0"/>
+          </a:p>
+        </p:txBody>
+      </p:sp>
+      <p:sp>
+        <p:nvSpPr>
+          <p:cNvPr id="4" name="投影片編號版面配置區 3"/>
+          <p:cNvSpPr>
+            <a:spLocks noGrp="1"/>
+          </p:cNvSpPr>
+          <p:nvPr>
+            <p:ph type="sldNum" sz="quarter" idx="5"/>
+          </p:nvPr>
+        </p:nvSpPr>
+        <p:spPr/>
+        <p:txBody>
+          <a:bodyPr/>
+          <a:lstStyle/>
+          <a:p>
+            <a:fld id="{87ADF86C-EF33-4B2D-AB8D-9458098BBA93}" type="slidenum">
+              <a:rPr lang="zh-TW" altLang="en-US" smtClean="0"/>
+              <a:t>48</a:t>
+            </a:fld>
+            <a:endParaRPr lang="zh-TW" altLang="en-US"/>
+          </a:p>
+        </p:txBody>
+      </p:sp>
+    </p:spTree>
+    <p:extLst>
+      <p:ext uri="{BB962C8B-B14F-4D97-AF65-F5344CB8AC3E}">
+        <p14:creationId xmlns:p14="http://schemas.microsoft.com/office/powerpoint/2010/main" val="1719994845"/>
+      </p:ext>
+    </p:extLst>
+  </p:cSld>
+  <p:clrMapOvr>
+    <a:masterClrMapping/>
+  </p:clrMapOvr>
+</p:notes>
+</file>
+
+<file path=ppt/notesSlides/notesSlide24.xml><?xml version="1.0" encoding="utf-8"?>
+<p:notes xmlns:a="http://schemas.openxmlformats.org/drawingml/2006/main" xmlns:r="http://schemas.openxmlformats.org/officeDocument/2006/relationships" xmlns:p="http://schemas.openxmlformats.org/presentationml/2006/main">
+  <p:cSld>
+    <p:spTree>
+      <p:nvGrpSpPr>
+        <p:cNvPr id="1" name=""/>
+        <p:cNvGrpSpPr/>
+        <p:nvPr/>
+      </p:nvGrpSpPr>
+      <p:grpSpPr>
+        <a:xfrm>
+          <a:off x="0" y="0"/>
+          <a:ext cx="0" cy="0"/>
+          <a:chOff x="0" y="0"/>
+          <a:chExt cx="0" cy="0"/>
+        </a:xfrm>
+      </p:grpSpPr>
+      <p:sp>
+        <p:nvSpPr>
+          <p:cNvPr id="2" name="投影片影像版面配置區 1"/>
+          <p:cNvSpPr>
+            <a:spLocks noGrp="1" noRot="1" noChangeAspect="1"/>
+          </p:cNvSpPr>
+          <p:nvPr>
+            <p:ph type="sldImg"/>
+          </p:nvPr>
+        </p:nvSpPr>
+        <p:spPr/>
+      </p:sp>
+      <p:sp>
+        <p:nvSpPr>
+          <p:cNvPr id="3" name="備忘稿版面配置區 2"/>
+          <p:cNvSpPr>
+            <a:spLocks noGrp="1"/>
+          </p:cNvSpPr>
+          <p:nvPr>
+            <p:ph type="body" idx="1"/>
+          </p:nvPr>
+        </p:nvSpPr>
+        <p:spPr/>
+        <p:txBody>
+          <a:bodyPr/>
+          <a:lstStyle/>
+          <a:p>
+            <a:r>
+              <a:rPr lang="zh-TW" altLang="en-US" dirty="0"/>
+              <a:t>這裡是講</a:t>
+            </a:r>
+            <a:r>
+              <a:rPr lang="en-US" altLang="zh-TW" dirty="0"/>
+              <a:t>do…while</a:t>
+            </a:r>
+            <a:r>
+              <a:rPr lang="zh-TW" altLang="en-US" dirty="0"/>
+              <a:t>的用途，不是範例</a:t>
+            </a:r>
+          </a:p>
+        </p:txBody>
+      </p:sp>
+      <p:sp>
+        <p:nvSpPr>
+          <p:cNvPr id="4" name="投影片編號版面配置區 3"/>
+          <p:cNvSpPr>
+            <a:spLocks noGrp="1"/>
+          </p:cNvSpPr>
+          <p:nvPr>
+            <p:ph type="sldNum" sz="quarter" idx="5"/>
+          </p:nvPr>
+        </p:nvSpPr>
+        <p:spPr/>
+        <p:txBody>
+          <a:bodyPr/>
+          <a:lstStyle/>
+          <a:p>
+            <a:fld id="{87ADF86C-EF33-4B2D-AB8D-9458098BBA93}" type="slidenum">
+              <a:rPr lang="zh-TW" altLang="en-US" smtClean="0"/>
+              <a:t>49</a:t>
+            </a:fld>
+            <a:endParaRPr lang="zh-TW" altLang="en-US"/>
+          </a:p>
+        </p:txBody>
+      </p:sp>
+    </p:spTree>
+    <p:extLst>
+      <p:ext uri="{BB962C8B-B14F-4D97-AF65-F5344CB8AC3E}">
+        <p14:creationId xmlns:p14="http://schemas.microsoft.com/office/powerpoint/2010/main" val="3393505391"/>
+      </p:ext>
+    </p:extLst>
+  </p:cSld>
+  <p:clrMapOvr>
+    <a:masterClrMapping/>
+  </p:clrMapOvr>
+</p:notes>
+</file>
+
+<file path=ppt/notesSlides/notesSlide25.xml><?xml version="1.0" encoding="utf-8"?>
+<p:notes xmlns:a="http://schemas.openxmlformats.org/drawingml/2006/main" xmlns:r="http://schemas.openxmlformats.org/officeDocument/2006/relationships" xmlns:p="http://schemas.openxmlformats.org/presentationml/2006/main">
+  <p:cSld>
+    <p:spTree>
+      <p:nvGrpSpPr>
+        <p:cNvPr id="1" name=""/>
+        <p:cNvGrpSpPr/>
+        <p:nvPr/>
+      </p:nvGrpSpPr>
+      <p:grpSpPr>
+        <a:xfrm>
+          <a:off x="0" y="0"/>
+          <a:ext cx="0" cy="0"/>
+          <a:chOff x="0" y="0"/>
+          <a:chExt cx="0" cy="0"/>
+        </a:xfrm>
+      </p:grpSpPr>
+      <p:sp>
+        <p:nvSpPr>
+          <p:cNvPr id="2" name="投影片影像版面配置區 1"/>
+          <p:cNvSpPr>
+            <a:spLocks noGrp="1" noRot="1" noChangeAspect="1"/>
+          </p:cNvSpPr>
+          <p:nvPr>
+            <p:ph type="sldImg"/>
+          </p:nvPr>
+        </p:nvSpPr>
+        <p:spPr/>
+      </p:sp>
+      <p:sp>
+        <p:nvSpPr>
+          <p:cNvPr id="3" name="備忘稿版面配置區 2"/>
+          <p:cNvSpPr>
+            <a:spLocks noGrp="1"/>
+          </p:cNvSpPr>
+          <p:nvPr>
+            <p:ph type="body" idx="1"/>
+          </p:nvPr>
+        </p:nvSpPr>
+        <p:spPr/>
+        <p:txBody>
+          <a:bodyPr/>
+          <a:lstStyle/>
+          <a:p>
+            <a:r>
+              <a:rPr lang="zh-TW" altLang="en-US" dirty="0"/>
+              <a:t>如果有相同的身高</a:t>
+            </a:r>
+            <a:r>
+              <a:rPr lang="en-US" altLang="zh-TW" dirty="0"/>
+              <a:t>?</a:t>
+            </a:r>
+          </a:p>
+        </p:txBody>
+      </p:sp>
+      <p:sp>
+        <p:nvSpPr>
+          <p:cNvPr id="4" name="投影片編號版面配置區 3"/>
+          <p:cNvSpPr>
+            <a:spLocks noGrp="1"/>
+          </p:cNvSpPr>
+          <p:nvPr>
+            <p:ph type="sldNum" sz="quarter" idx="5"/>
+          </p:nvPr>
+        </p:nvSpPr>
+        <p:spPr/>
+        <p:txBody>
+          <a:bodyPr/>
+          <a:lstStyle/>
+          <a:p>
+            <a:fld id="{87ADF86C-EF33-4B2D-AB8D-9458098BBA93}" type="slidenum">
+              <a:rPr lang="zh-TW" altLang="en-US" smtClean="0"/>
+              <a:t>68</a:t>
+            </a:fld>
+            <a:endParaRPr lang="zh-TW" altLang="en-US"/>
+          </a:p>
+        </p:txBody>
+      </p:sp>
+    </p:spTree>
+    <p:extLst>
+      <p:ext uri="{BB962C8B-B14F-4D97-AF65-F5344CB8AC3E}">
+        <p14:creationId xmlns:p14="http://schemas.microsoft.com/office/powerpoint/2010/main" val="1004682607"/>
       </p:ext>
     </p:extLst>
   </p:cSld>
@@ -1866,7 +2495,7 @@
           <a:p>
             <a:fld id="{87ADF86C-EF33-4B2D-AB8D-9458098BBA93}" type="slidenum">
               <a:rPr lang="zh-TW" altLang="en-US" smtClean="0"/>
-              <a:t>7</a:t>
+              <a:t>3</a:t>
             </a:fld>
             <a:endParaRPr lang="zh-TW" altLang="en-US"/>
           </a:p>
@@ -1875,7 +2504,7 @@
     </p:spTree>
     <p:extLst>
       <p:ext uri="{BB962C8B-B14F-4D97-AF65-F5344CB8AC3E}">
-        <p14:creationId xmlns:p14="http://schemas.microsoft.com/office/powerpoint/2010/main" val="1222831664"/>
+        <p14:creationId xmlns:p14="http://schemas.microsoft.com/office/powerpoint/2010/main" val="2630192991"/>
       </p:ext>
     </p:extLst>
   </p:cSld>
@@ -1930,22 +2559,9 @@
           <a:lstStyle/>
           <a:p>
             <a:r>
-              <a:rPr lang="en-US" altLang="zh-TW" dirty="0"/>
-              <a:t>-Wall –</a:t>
-            </a:r>
-            <a:r>
-              <a:rPr lang="en-US" altLang="zh-TW" dirty="0" err="1"/>
-              <a:t>Wextra</a:t>
-            </a:r>
-            <a:r>
-              <a:rPr lang="en-US" altLang="zh-TW" dirty="0"/>
-              <a:t> -</a:t>
-            </a:r>
-            <a:r>
-              <a:rPr lang="en-US" altLang="zh-TW" dirty="0" err="1"/>
-              <a:t>Werror</a:t>
-            </a:r>
-            <a:endParaRPr lang="zh-TW" altLang="en-US" dirty="0"/>
+              <a:rPr lang="zh-TW" altLang="en-US" dirty="0"/>
+              <a:t>我第一章的東西會比較雜一點，比較有主題性的東西會在之後的課程，今天這堂課主要算是引導，然後講一點寫程式的小陷阱跟函式庫。</a:t>
+            </a:r>
           </a:p>
         </p:txBody>
       </p:sp>
@@ -1966,7 +2582,7 @@
           <a:p>
             <a:fld id="{87ADF86C-EF33-4B2D-AB8D-9458098BBA93}" type="slidenum">
               <a:rPr lang="zh-TW" altLang="en-US" smtClean="0"/>
-              <a:t>8</a:t>
+              <a:t>4</a:t>
             </a:fld>
             <a:endParaRPr lang="zh-TW" altLang="en-US"/>
           </a:p>
@@ -1975,7 +2591,7 @@
     </p:spTree>
     <p:extLst>
       <p:ext uri="{BB962C8B-B14F-4D97-AF65-F5344CB8AC3E}">
-        <p14:creationId xmlns:p14="http://schemas.microsoft.com/office/powerpoint/2010/main" val="3664922964"/>
+        <p14:creationId xmlns:p14="http://schemas.microsoft.com/office/powerpoint/2010/main" val="982979191"/>
       </p:ext>
     </p:extLst>
   </p:cSld>
@@ -2030,34 +2646,49 @@
           <a:lstStyle/>
           <a:p>
             <a:r>
+              <a:rPr lang="zh-TW" altLang="en-US" dirty="0"/>
+              <a:t>第一件要講的是</a:t>
+            </a:r>
+            <a:r>
               <a:rPr lang="en-US" altLang="zh-TW" dirty="0"/>
-              <a:t>(</a:t>
+              <a:t>915</a:t>
             </a:r>
             <a:r>
               <a:rPr lang="zh-TW" altLang="en-US" dirty="0"/>
-              <a:t>演示</a:t>
+              <a:t>給的</a:t>
             </a:r>
             <a:r>
               <a:rPr lang="en-US" altLang="zh-TW" dirty="0"/>
-              <a:t>floating point</a:t>
+              <a:t>c/</a:t>
+            </a:r>
+            <a:r>
+              <a:rPr lang="en-US" altLang="zh-TW" dirty="0" err="1"/>
+              <a:t>c++</a:t>
             </a:r>
             <a:r>
               <a:rPr lang="zh-TW" altLang="en-US" dirty="0"/>
-              <a:t>在</a:t>
+              <a:t> </a:t>
             </a:r>
             <a:r>
               <a:rPr lang="en-US" altLang="zh-TW" dirty="0"/>
-              <a:t>optimization</a:t>
+              <a:t>IDE</a:t>
             </a:r>
             <a:r>
               <a:rPr lang="zh-TW" altLang="en-US" dirty="0"/>
-              <a:t>下的問題</a:t>
+              <a:t>。</a:t>
+            </a:r>
+            <a:r>
+              <a:rPr lang="en-US" altLang="zh-TW" dirty="0" err="1"/>
+              <a:t>devC</a:t>
             </a:r>
             <a:r>
               <a:rPr lang="en-US" altLang="zh-TW" dirty="0"/>
-              <a:t>)</a:t>
-            </a:r>
-            <a:endParaRPr lang="zh-TW" altLang="en-US" dirty="0"/>
+              <a:t>++</a:t>
+            </a:r>
+            <a:r>
+              <a:rPr lang="zh-TW" altLang="en-US" dirty="0"/>
+              <a:t>不是編譯器。</a:t>
+            </a:r>
           </a:p>
         </p:txBody>
       </p:sp>
@@ -2078,7 +2709,7 @@
           <a:p>
             <a:fld id="{87ADF86C-EF33-4B2D-AB8D-9458098BBA93}" type="slidenum">
               <a:rPr lang="zh-TW" altLang="en-US" smtClean="0"/>
-              <a:t>9</a:t>
+              <a:t>5</a:t>
             </a:fld>
             <a:endParaRPr lang="zh-TW" altLang="en-US"/>
           </a:p>
@@ -2087,7 +2718,7 @@
     </p:spTree>
     <p:extLst>
       <p:ext uri="{BB962C8B-B14F-4D97-AF65-F5344CB8AC3E}">
-        <p14:creationId xmlns:p14="http://schemas.microsoft.com/office/powerpoint/2010/main" val="2570696564"/>
+        <p14:creationId xmlns:p14="http://schemas.microsoft.com/office/powerpoint/2010/main" val="2391434028"/>
       </p:ext>
     </p:extLst>
   </p:cSld>
@@ -2143,87 +2774,48 @@
           <a:p>
             <a:r>
               <a:rPr lang="en-US" altLang="zh-TW" dirty="0"/>
-              <a:t>[]</a:t>
+              <a:t>IDE(</a:t>
             </a:r>
             <a:r>
               <a:rPr lang="zh-TW" altLang="en-US" dirty="0"/>
-              <a:t>是吃什麼字元，比如</a:t>
+              <a:t>集成開發環境</a:t>
             </a:r>
             <a:r>
               <a:rPr lang="en-US" altLang="zh-TW" dirty="0"/>
-              <a:t>%[</a:t>
+              <a:t>)</a:t>
+            </a:r>
+            <a:r>
+              <a:rPr lang="zh-TW" altLang="en-US" dirty="0"/>
+              <a:t>就是把編輯器、檔案管理、編譯器、</a:t>
+            </a:r>
+            <a:r>
+              <a:rPr lang="en-US" altLang="zh-TW" dirty="0"/>
+              <a:t>debugger</a:t>
+            </a:r>
+            <a:r>
+              <a:rPr lang="zh-TW" altLang="en-US" dirty="0"/>
+              <a:t>、執行環境全部整合在一起的軟體。</a:t>
+            </a:r>
+            <a:endParaRPr lang="en-US" altLang="zh-TW" dirty="0"/>
+          </a:p>
+          <a:p>
+            <a:r>
+              <a:rPr lang="en-US" altLang="zh-TW" dirty="0"/>
+              <a:t>(Dev </a:t>
             </a:r>
             <a:r>
               <a:rPr lang="en-US" altLang="zh-TW" dirty="0" err="1"/>
-              <a:t>abc</a:t>
+              <a:t>c++</a:t>
+            </a:r>
+            <a:r>
+              <a:rPr lang="zh-TW" altLang="en-US" dirty="0"/>
+              <a:t>演示。</a:t>
             </a:r>
             <a:r>
               <a:rPr lang="en-US" altLang="zh-TW" dirty="0"/>
-              <a:t>]s</a:t>
-            </a:r>
-            <a:r>
-              <a:rPr lang="zh-TW" altLang="en-US" dirty="0"/>
-              <a:t>就只吃</a:t>
-            </a:r>
-            <a:r>
-              <a:rPr lang="en-US" altLang="zh-TW" dirty="0" err="1"/>
-              <a:t>abc</a:t>
-            </a:r>
-            <a:r>
-              <a:rPr lang="zh-TW" altLang="en-US" dirty="0"/>
-              <a:t>這三種字元，</a:t>
-            </a:r>
-            <a:r>
-              <a:rPr lang="en-US" altLang="zh-TW" dirty="0"/>
-              <a:t>%[0-9]</a:t>
-            </a:r>
-            <a:r>
-              <a:rPr lang="zh-TW" altLang="en-US" dirty="0"/>
-              <a:t>就只吃數字。</a:t>
-            </a:r>
-            <a:endParaRPr lang="en-US" altLang="zh-TW" dirty="0"/>
-          </a:p>
-          <a:p>
-            <a:r>
-              <a:rPr lang="en-US" altLang="zh-TW" dirty="0"/>
-              <a:t>[^]</a:t>
-            </a:r>
-            <a:r>
-              <a:rPr lang="zh-TW" altLang="en-US" dirty="0"/>
-              <a:t>是不吃甚麼字元，比如</a:t>
-            </a:r>
-            <a:r>
-              <a:rPr lang="en-US" altLang="zh-TW" dirty="0"/>
-              <a:t>%[^\n]s</a:t>
-            </a:r>
-            <a:r>
-              <a:rPr lang="zh-TW" altLang="en-US" dirty="0"/>
-              <a:t>就是除了</a:t>
-            </a:r>
-            <a:r>
-              <a:rPr lang="en-US" altLang="zh-TW" dirty="0"/>
-              <a:t>’\n’</a:t>
-            </a:r>
-            <a:r>
-              <a:rPr lang="zh-TW" altLang="en-US" dirty="0"/>
-              <a:t>其他都吃，</a:t>
-            </a:r>
-            <a:r>
-              <a:rPr lang="en-US" altLang="zh-TW" dirty="0"/>
-              <a:t>%[^0-9]s</a:t>
-            </a:r>
-            <a:r>
-              <a:rPr lang="zh-TW" altLang="en-US" dirty="0"/>
-              <a:t>就是除了數字其他都吃，</a:t>
-            </a:r>
-            <a:r>
-              <a:rPr lang="en-US" altLang="zh-TW" dirty="0"/>
-              <a:t>%[^a-z]s</a:t>
-            </a:r>
-            <a:r>
-              <a:rPr lang="zh-TW" altLang="en-US" dirty="0"/>
-              <a:t>就是除了小寫字母其他都吃。</a:t>
-            </a:r>
+              <a:t>)</a:t>
+            </a:r>
+            <a:endParaRPr lang="zh-TW" altLang="en-US" dirty="0"/>
           </a:p>
         </p:txBody>
       </p:sp>
@@ -2244,7 +2836,7 @@
           <a:p>
             <a:fld id="{87ADF86C-EF33-4B2D-AB8D-9458098BBA93}" type="slidenum">
               <a:rPr lang="zh-TW" altLang="en-US" smtClean="0"/>
-              <a:t>14</a:t>
+              <a:t>6</a:t>
             </a:fld>
             <a:endParaRPr lang="zh-TW" altLang="en-US"/>
           </a:p>
@@ -2253,7 +2845,7 @@
     </p:spTree>
     <p:extLst>
       <p:ext uri="{BB962C8B-B14F-4D97-AF65-F5344CB8AC3E}">
-        <p14:creationId xmlns:p14="http://schemas.microsoft.com/office/powerpoint/2010/main" val="665931322"/>
+        <p14:creationId xmlns:p14="http://schemas.microsoft.com/office/powerpoint/2010/main" val="3895625923"/>
       </p:ext>
     </p:extLst>
   </p:cSld>
@@ -2309,47 +2901,31 @@
           <a:p>
             <a:r>
               <a:rPr lang="zh-TW" altLang="en-US" dirty="0"/>
-              <a:t>先講</a:t>
+              <a:t>我沒有很喜歡</a:t>
             </a:r>
             <a:r>
               <a:rPr lang="en-US" altLang="zh-TW" dirty="0"/>
-              <a:t>~</a:t>
-            </a:r>
-            <a:r>
-              <a:rPr lang="en-US" altLang="zh-TW" dirty="0" err="1"/>
-              <a:t>scanf</a:t>
+              <a:t>IDE</a:t>
+            </a:r>
+            <a:r>
+              <a:rPr lang="zh-TW" altLang="en-US" dirty="0"/>
+              <a:t>，為甚麼呢</a:t>
             </a:r>
             <a:r>
               <a:rPr lang="en-US" altLang="zh-TW" dirty="0"/>
-              <a:t>()</a:t>
+              <a:t>?</a:t>
             </a:r>
             <a:r>
               <a:rPr lang="zh-TW" altLang="en-US" dirty="0"/>
-              <a:t>，</a:t>
-            </a:r>
-            <a:r>
-              <a:rPr lang="en-US" altLang="zh-TW" dirty="0" err="1"/>
-              <a:t>scanf</a:t>
+              <a:t> 雖然</a:t>
+            </a:r>
+            <a:r>
+              <a:rPr lang="en-US" altLang="zh-TW" dirty="0"/>
+              <a:t>IDE</a:t>
             </a:r>
             <a:r>
               <a:rPr lang="zh-TW" altLang="en-US" dirty="0"/>
-              <a:t>回傳</a:t>
-            </a:r>
-            <a:r>
-              <a:rPr lang="en-US" altLang="zh-TW" dirty="0"/>
-              <a:t>1.</a:t>
-            </a:r>
-            <a:r>
-              <a:rPr lang="zh-TW" altLang="en-US" dirty="0"/>
-              <a:t>成功賦值的變數 </a:t>
-            </a:r>
-            <a:r>
-              <a:rPr lang="en-US" altLang="zh-TW" dirty="0"/>
-              <a:t>2.EOF if can’t read anymore</a:t>
-            </a:r>
-            <a:r>
-              <a:rPr lang="zh-TW" altLang="en-US" dirty="0"/>
-              <a:t>。</a:t>
+              <a:t>對新手很友善，但是他隱藏太多細節了。</a:t>
             </a:r>
           </a:p>
         </p:txBody>
@@ -2371,7 +2947,7 @@
           <a:p>
             <a:fld id="{87ADF86C-EF33-4B2D-AB8D-9458098BBA93}" type="slidenum">
               <a:rPr lang="zh-TW" altLang="en-US" smtClean="0"/>
-              <a:t>17</a:t>
+              <a:t>7</a:t>
             </a:fld>
             <a:endParaRPr lang="zh-TW" altLang="en-US"/>
           </a:p>
@@ -2380,7 +2956,7 @@
     </p:spTree>
     <p:extLst>
       <p:ext uri="{BB962C8B-B14F-4D97-AF65-F5344CB8AC3E}">
-        <p14:creationId xmlns:p14="http://schemas.microsoft.com/office/powerpoint/2010/main" val="707070701"/>
+        <p14:creationId xmlns:p14="http://schemas.microsoft.com/office/powerpoint/2010/main" val="1222831664"/>
       </p:ext>
     </p:extLst>
   </p:cSld>
@@ -2435,9 +3011,22 @@
           <a:lstStyle/>
           <a:p>
             <a:r>
-              <a:rPr lang="zh-TW" altLang="en-US" dirty="0"/>
-              <a:t>程式講解</a:t>
-            </a:r>
+              <a:rPr lang="en-US" altLang="zh-TW" dirty="0"/>
+              <a:t>-Wall –</a:t>
+            </a:r>
+            <a:r>
+              <a:rPr lang="en-US" altLang="zh-TW" dirty="0" err="1"/>
+              <a:t>Wextra</a:t>
+            </a:r>
+            <a:r>
+              <a:rPr lang="en-US" altLang="zh-TW" dirty="0"/>
+              <a:t> -</a:t>
+            </a:r>
+            <a:r>
+              <a:rPr lang="en-US" altLang="zh-TW" dirty="0" err="1"/>
+              <a:t>Werror</a:t>
+            </a:r>
+            <a:endParaRPr lang="zh-TW" altLang="en-US" dirty="0"/>
           </a:p>
         </p:txBody>
       </p:sp>
@@ -2458,7 +3047,7 @@
           <a:p>
             <a:fld id="{87ADF86C-EF33-4B2D-AB8D-9458098BBA93}" type="slidenum">
               <a:rPr lang="zh-TW" altLang="en-US" smtClean="0"/>
-              <a:t>19</a:t>
+              <a:t>8</a:t>
             </a:fld>
             <a:endParaRPr lang="zh-TW" altLang="en-US"/>
           </a:p>
@@ -2467,7 +3056,7 @@
     </p:spTree>
     <p:extLst>
       <p:ext uri="{BB962C8B-B14F-4D97-AF65-F5344CB8AC3E}">
-        <p14:creationId xmlns:p14="http://schemas.microsoft.com/office/powerpoint/2010/main" val="1468201492"/>
+        <p14:creationId xmlns:p14="http://schemas.microsoft.com/office/powerpoint/2010/main" val="3664922964"/>
       </p:ext>
     </p:extLst>
   </p:cSld>
@@ -2521,27 +3110,96 @@
           <a:bodyPr/>
           <a:lstStyle/>
           <a:p>
-            <a:pPr marL="0" marR="0" lvl="0" indent="0" algn="l" defTabSz="914400" rtl="0" eaLnBrk="1" fontAlgn="auto" latinLnBrk="0" hangingPunct="1">
-              <a:lnSpc>
-                <a:spcPct val="100000"/>
-              </a:lnSpc>
-              <a:spcBef>
-                <a:spcPts val="0"/>
-              </a:spcBef>
-              <a:spcAft>
-                <a:spcPts val="0"/>
-              </a:spcAft>
-              <a:buClrTx/>
-              <a:buSzTx/>
-              <a:buFontTx/>
-              <a:buNone/>
-              <a:tabLst/>
-              <a:defRPr/>
-            </a:pPr>
             <a:r>
               <a:rPr lang="zh-TW" altLang="en-US" dirty="0"/>
-              <a:t>程式講解</a:t>
-            </a:r>
+              <a:t>當今天把細節都隱藏起來，對新手是友善沒錯，但是這也會讓人看不到問題、沒辦法了解背後程式怎麼產生的、運作的原理是甚麼。</a:t>
+            </a:r>
+            <a:endParaRPr lang="en-US" altLang="zh-TW" dirty="0"/>
+          </a:p>
+          <a:p>
+            <a:r>
+              <a:rPr lang="zh-TW" altLang="en-US" dirty="0"/>
+              <a:t>而這些細節正好就是</a:t>
+            </a:r>
+            <a:r>
+              <a:rPr lang="en-US" altLang="zh-TW" dirty="0"/>
+              <a:t>senior programmer</a:t>
+            </a:r>
+            <a:r>
+              <a:rPr lang="zh-TW" altLang="en-US" dirty="0"/>
+              <a:t>與</a:t>
+            </a:r>
+            <a:r>
+              <a:rPr lang="en-US" altLang="zh-TW" dirty="0"/>
+              <a:t>junior programmer</a:t>
+            </a:r>
+            <a:r>
+              <a:rPr lang="zh-TW" altLang="en-US" dirty="0"/>
+              <a:t>的差別。</a:t>
+            </a:r>
+            <a:endParaRPr lang="en-US" altLang="zh-TW" dirty="0"/>
+          </a:p>
+          <a:p>
+            <a:r>
+              <a:rPr lang="zh-TW" altLang="en-US" dirty="0"/>
+              <a:t>舉個例子</a:t>
+            </a:r>
+            <a:r>
+              <a:rPr lang="en-US" altLang="zh-TW" dirty="0"/>
+              <a:t>:</a:t>
+            </a:r>
+            <a:r>
+              <a:rPr lang="zh-TW" altLang="en-US" dirty="0"/>
+              <a:t> </a:t>
+            </a:r>
+            <a:r>
+              <a:rPr lang="en-US" altLang="zh-TW" dirty="0"/>
+              <a:t>floating point</a:t>
+            </a:r>
+            <a:r>
+              <a:rPr lang="zh-TW" altLang="en-US" dirty="0"/>
+              <a:t>在</a:t>
+            </a:r>
+            <a:r>
+              <a:rPr lang="en-US" altLang="zh-TW" dirty="0"/>
+              <a:t>optimization</a:t>
+            </a:r>
+            <a:r>
+              <a:rPr lang="zh-TW" altLang="en-US" dirty="0"/>
+              <a:t>下的問題。</a:t>
+            </a:r>
+            <a:endParaRPr lang="en-US" altLang="zh-TW" dirty="0"/>
+          </a:p>
+          <a:p>
+            <a:r>
+              <a:rPr lang="en-US" altLang="zh-TW" dirty="0"/>
+              <a:t>(</a:t>
+            </a:r>
+            <a:r>
+              <a:rPr lang="zh-TW" altLang="en-US" dirty="0"/>
+              <a:t>演示</a:t>
+            </a:r>
+            <a:r>
+              <a:rPr lang="en-US" altLang="zh-TW" dirty="0"/>
+              <a:t>floating point</a:t>
+            </a:r>
+            <a:r>
+              <a:rPr lang="zh-TW" altLang="en-US" dirty="0"/>
+              <a:t>在</a:t>
+            </a:r>
+            <a:r>
+              <a:rPr lang="en-US" altLang="zh-TW" dirty="0"/>
+              <a:t>optimization</a:t>
+            </a:r>
+            <a:r>
+              <a:rPr lang="zh-TW" altLang="en-US" dirty="0"/>
+              <a:t>下的問題</a:t>
+            </a:r>
+            <a:r>
+              <a:rPr lang="en-US" altLang="zh-TW" dirty="0"/>
+              <a:t>)</a:t>
+            </a:r>
+            <a:endParaRPr lang="zh-TW" altLang="en-US" dirty="0"/>
           </a:p>
         </p:txBody>
       </p:sp>
@@ -2562,7 +3220,7 @@
           <a:p>
             <a:fld id="{87ADF86C-EF33-4B2D-AB8D-9458098BBA93}" type="slidenum">
               <a:rPr lang="zh-TW" altLang="en-US" smtClean="0"/>
-              <a:t>20</a:t>
+              <a:t>9</a:t>
             </a:fld>
             <a:endParaRPr lang="zh-TW" altLang="en-US"/>
           </a:p>
@@ -2571,7 +3229,7 @@
     </p:spTree>
     <p:extLst>
       <p:ext uri="{BB962C8B-B14F-4D97-AF65-F5344CB8AC3E}">
-        <p14:creationId xmlns:p14="http://schemas.microsoft.com/office/powerpoint/2010/main" val="263008912"/>
+        <p14:creationId xmlns:p14="http://schemas.microsoft.com/office/powerpoint/2010/main" val="2570696564"/>
       </p:ext>
     </p:extLst>
   </p:cSld>
@@ -2712,7 +3370,7 @@
           <a:p>
             <a:fld id="{ABB345C4-D81E-4C8D-86A1-B639E123A710}" type="datetimeFigureOut">
               <a:rPr lang="zh-TW" altLang="en-US" smtClean="0"/>
-              <a:t>2022/11/15</a:t>
+              <a:t>2022/11/17</a:t>
             </a:fld>
             <a:endParaRPr lang="zh-TW" altLang="en-US"/>
           </a:p>
@@ -2882,7 +3540,7 @@
           <a:p>
             <a:fld id="{ABB345C4-D81E-4C8D-86A1-B639E123A710}" type="datetimeFigureOut">
               <a:rPr lang="zh-TW" altLang="en-US" smtClean="0"/>
-              <a:t>2022/11/15</a:t>
+              <a:t>2022/11/17</a:t>
             </a:fld>
             <a:endParaRPr lang="zh-TW" altLang="en-US"/>
           </a:p>
@@ -3062,7 +3720,7 @@
           <a:p>
             <a:fld id="{ABB345C4-D81E-4C8D-86A1-B639E123A710}" type="datetimeFigureOut">
               <a:rPr lang="zh-TW" altLang="en-US" smtClean="0"/>
-              <a:t>2022/11/15</a:t>
+              <a:t>2022/11/17</a:t>
             </a:fld>
             <a:endParaRPr lang="zh-TW" altLang="en-US"/>
           </a:p>
@@ -3232,7 +3890,7 @@
           <a:p>
             <a:fld id="{ABB345C4-D81E-4C8D-86A1-B639E123A710}" type="datetimeFigureOut">
               <a:rPr lang="zh-TW" altLang="en-US" smtClean="0"/>
-              <a:t>2022/11/15</a:t>
+              <a:t>2022/11/17</a:t>
             </a:fld>
             <a:endParaRPr lang="zh-TW" altLang="en-US"/>
           </a:p>
@@ -3478,7 +4136,7 @@
           <a:p>
             <a:fld id="{ABB345C4-D81E-4C8D-86A1-B639E123A710}" type="datetimeFigureOut">
               <a:rPr lang="zh-TW" altLang="en-US" smtClean="0"/>
-              <a:t>2022/11/15</a:t>
+              <a:t>2022/11/17</a:t>
             </a:fld>
             <a:endParaRPr lang="zh-TW" altLang="en-US"/>
           </a:p>
@@ -3710,7 +4368,7 @@
           <a:p>
             <a:fld id="{ABB345C4-D81E-4C8D-86A1-B639E123A710}" type="datetimeFigureOut">
               <a:rPr lang="zh-TW" altLang="en-US" smtClean="0"/>
-              <a:t>2022/11/15</a:t>
+              <a:t>2022/11/17</a:t>
             </a:fld>
             <a:endParaRPr lang="zh-TW" altLang="en-US"/>
           </a:p>
@@ -4077,7 +4735,7 @@
           <a:p>
             <a:fld id="{ABB345C4-D81E-4C8D-86A1-B639E123A710}" type="datetimeFigureOut">
               <a:rPr lang="zh-TW" altLang="en-US" smtClean="0"/>
-              <a:t>2022/11/15</a:t>
+              <a:t>2022/11/17</a:t>
             </a:fld>
             <a:endParaRPr lang="zh-TW" altLang="en-US"/>
           </a:p>
@@ -4195,7 +4853,7 @@
           <a:p>
             <a:fld id="{ABB345C4-D81E-4C8D-86A1-B639E123A710}" type="datetimeFigureOut">
               <a:rPr lang="zh-TW" altLang="en-US" smtClean="0"/>
-              <a:t>2022/11/15</a:t>
+              <a:t>2022/11/17</a:t>
             </a:fld>
             <a:endParaRPr lang="zh-TW" altLang="en-US"/>
           </a:p>
@@ -4290,7 +4948,7 @@
           <a:p>
             <a:fld id="{ABB345C4-D81E-4C8D-86A1-B639E123A710}" type="datetimeFigureOut">
               <a:rPr lang="zh-TW" altLang="en-US" smtClean="0"/>
-              <a:t>2022/11/15</a:t>
+              <a:t>2022/11/17</a:t>
             </a:fld>
             <a:endParaRPr lang="zh-TW" altLang="en-US"/>
           </a:p>
@@ -4567,7 +5225,7 @@
           <a:p>
             <a:fld id="{ABB345C4-D81E-4C8D-86A1-B639E123A710}" type="datetimeFigureOut">
               <a:rPr lang="zh-TW" altLang="en-US" smtClean="0"/>
-              <a:t>2022/11/15</a:t>
+              <a:t>2022/11/17</a:t>
             </a:fld>
             <a:endParaRPr lang="zh-TW" altLang="en-US"/>
           </a:p>
@@ -4824,7 +5482,7 @@
           <a:p>
             <a:fld id="{ABB345C4-D81E-4C8D-86A1-B639E123A710}" type="datetimeFigureOut">
               <a:rPr lang="zh-TW" altLang="en-US" smtClean="0"/>
-              <a:t>2022/11/15</a:t>
+              <a:t>2022/11/17</a:t>
             </a:fld>
             <a:endParaRPr lang="zh-TW" altLang="en-US"/>
           </a:p>
@@ -5037,7 +5695,7 @@
           <a:p>
             <a:fld id="{ABB345C4-D81E-4C8D-86A1-B639E123A710}" type="datetimeFigureOut">
               <a:rPr lang="zh-TW" altLang="en-US" smtClean="0"/>
-              <a:t>2022/11/15</a:t>
+              <a:t>2022/11/17</a:t>
             </a:fld>
             <a:endParaRPr lang="zh-TW" altLang="en-US"/>
           </a:p>
@@ -6006,6 +6664,20 @@
               </a:rPr>
               <a:t>?</a:t>
             </a:r>
+          </a:p>
+          <a:p>
+            <a:r>
+              <a:rPr lang="en-US" altLang="zh-TW" dirty="0" err="1">
+                <a:latin typeface="Consolas" panose="020B0609020204030204" pitchFamily="49" charset="0"/>
+              </a:rPr>
+              <a:t>scanf</a:t>
+            </a:r>
+            <a:r>
+              <a:rPr lang="en-US" altLang="zh-TW" dirty="0">
+                <a:latin typeface="Consolas" panose="020B0609020204030204" pitchFamily="49" charset="0"/>
+              </a:rPr>
+              <a:t> trap</a:t>
+            </a:r>
             <a:endParaRPr lang="zh-TW" altLang="en-US" dirty="0">
               <a:latin typeface="Consolas" panose="020B0609020204030204" pitchFamily="49" charset="0"/>
             </a:endParaRPr>
@@ -15495,18 +16167,11 @@
               <a:t>可以用來替換字串、字串串接、展開</a:t>
             </a:r>
             <a:r>
-              <a:rPr lang="en-US" altLang="zh-TW" dirty="0" err="1">
-                <a:latin typeface="Consolas" panose="020B0609020204030204" pitchFamily="49" charset="0"/>
-                <a:ea typeface="微軟正黑體" panose="020B0604030504040204" pitchFamily="34" charset="-120"/>
-              </a:rPr>
-              <a:t>marco</a:t>
-            </a:r>
-            <a:r>
               <a:rPr lang="en-US" altLang="zh-TW" dirty="0">
                 <a:latin typeface="Consolas" panose="020B0609020204030204" pitchFamily="49" charset="0"/>
                 <a:ea typeface="微軟正黑體" panose="020B0604030504040204" pitchFamily="34" charset="-120"/>
               </a:rPr>
-              <a:t>	</a:t>
+              <a:t>macro	</a:t>
             </a:r>
             <a:r>
               <a:rPr lang="zh-TW" altLang="en-US" dirty="0">
@@ -15715,8 +16380,16 @@
               <a:rPr lang="zh-TW" altLang="en-US" dirty="0">
                 <a:latin typeface="Consolas" panose="020B0609020204030204" pitchFamily="49" charset="0"/>
                 <a:ea typeface="微軟正黑體" panose="020B0604030504040204" pitchFamily="34" charset="-120"/>
-              </a:rPr>
-              <a:t>打過高中競程</a:t>
+                <a:hlinkClick r:id="rId3"/>
+              </a:rPr>
+              <a:t>嘉中競程培訓講義</a:t>
+            </a:r>
+            <a:r>
+              <a:rPr lang="zh-TW" altLang="en-US" dirty="0">
+                <a:latin typeface="Consolas" panose="020B0609020204030204" pitchFamily="49" charset="0"/>
+                <a:ea typeface="微軟正黑體" panose="020B0604030504040204" pitchFamily="34" charset="-120"/>
+              </a:rPr>
+              <a:t>共同作者</a:t>
             </a:r>
             <a:endParaRPr lang="en-US" altLang="zh-TW" dirty="0">
               <a:latin typeface="Consolas" panose="020B0609020204030204" pitchFamily="49" charset="0"/>
@@ -15728,16 +16401,36 @@
               <a:rPr lang="zh-TW" altLang="en-US" dirty="0">
                 <a:latin typeface="Consolas" panose="020B0609020204030204" pitchFamily="49" charset="0"/>
                 <a:ea typeface="微軟正黑體" panose="020B0604030504040204" pitchFamily="34" charset="-120"/>
-                <a:hlinkClick r:id="rId2"/>
-              </a:rPr>
-              <a:t>嘉中競程培訓講義</a:t>
+              </a:rPr>
+              <a:t>抵免上下學期的</a:t>
+            </a:r>
+            <a:r>
+              <a:rPr lang="en-US" altLang="zh-TW" dirty="0">
+                <a:latin typeface="Consolas" panose="020B0609020204030204" pitchFamily="49" charset="0"/>
+                <a:ea typeface="微軟正黑體" panose="020B0604030504040204" pitchFamily="34" charset="-120"/>
+              </a:rPr>
+              <a:t>C</a:t>
             </a:r>
             <a:r>
               <a:rPr lang="zh-TW" altLang="en-US" dirty="0">
                 <a:latin typeface="Consolas" panose="020B0609020204030204" pitchFamily="49" charset="0"/>
                 <a:ea typeface="微軟正黑體" panose="020B0604030504040204" pitchFamily="34" charset="-120"/>
               </a:rPr>
-              <a:t>共同作者</a:t>
+              <a:t>程</a:t>
+            </a:r>
+            <a:r>
+              <a:rPr lang="en-US" altLang="zh-TW" dirty="0">
+                <a:latin typeface="Consolas" panose="020B0609020204030204" pitchFamily="49" charset="0"/>
+                <a:ea typeface="微軟正黑體" panose="020B0604030504040204" pitchFamily="34" charset="-120"/>
+              </a:rPr>
+              <a:t>/C</a:t>
+            </a:r>
+            <a:r>
+              <a:rPr lang="zh-TW" altLang="en-US" dirty="0">
+                <a:latin typeface="Consolas" panose="020B0609020204030204" pitchFamily="49" charset="0"/>
+                <a:ea typeface="微軟正黑體" panose="020B0604030504040204" pitchFamily="34" charset="-120"/>
+              </a:rPr>
+              <a:t>程實驗</a:t>
             </a:r>
             <a:endParaRPr lang="en-US" altLang="zh-TW" dirty="0">
               <a:latin typeface="Consolas" panose="020B0609020204030204" pitchFamily="49" charset="0"/>
@@ -15746,39 +16439,60 @@
           </a:p>
           <a:p>
             <a:r>
+              <a:rPr lang="en-US" altLang="zh-TW" dirty="0">
+                <a:latin typeface="Consolas" panose="020B0609020204030204" pitchFamily="49" charset="0"/>
+                <a:ea typeface="微軟正黑體" panose="020B0604030504040204" pitchFamily="34" charset="-120"/>
+              </a:rPr>
+              <a:t>2021</a:t>
+            </a:r>
+            <a:r>
               <a:rPr lang="zh-TW" altLang="en-US" dirty="0">
                 <a:latin typeface="Consolas" panose="020B0609020204030204" pitchFamily="49" charset="0"/>
                 <a:ea typeface="微軟正黑體" panose="020B0604030504040204" pitchFamily="34" charset="-120"/>
               </a:rPr>
-              <a:t>抵免上下學期的</a:t>
+              <a:t>年</a:t>
             </a:r>
             <a:r>
               <a:rPr lang="en-US" altLang="zh-TW" dirty="0">
                 <a:latin typeface="Consolas" panose="020B0609020204030204" pitchFamily="49" charset="0"/>
                 <a:ea typeface="微軟正黑體" panose="020B0604030504040204" pitchFamily="34" charset="-120"/>
               </a:rPr>
-              <a:t>C</a:t>
+              <a:t>ICPC</a:t>
             </a:r>
             <a:r>
               <a:rPr lang="zh-TW" altLang="en-US" dirty="0">
                 <a:latin typeface="Consolas" panose="020B0609020204030204" pitchFamily="49" charset="0"/>
                 <a:ea typeface="微軟正黑體" panose="020B0604030504040204" pitchFamily="34" charset="-120"/>
               </a:rPr>
-              <a:t>程</a:t>
+              <a:t>選手、</a:t>
             </a:r>
             <a:r>
               <a:rPr lang="en-US" altLang="zh-TW" dirty="0">
                 <a:latin typeface="Consolas" panose="020B0609020204030204" pitchFamily="49" charset="0"/>
                 <a:ea typeface="微軟正黑體" panose="020B0604030504040204" pitchFamily="34" charset="-120"/>
               </a:rPr>
-              <a:t>/C</a:t>
+              <a:t>2022</a:t>
             </a:r>
             <a:r>
               <a:rPr lang="zh-TW" altLang="en-US" dirty="0">
                 <a:latin typeface="Consolas" panose="020B0609020204030204" pitchFamily="49" charset="0"/>
                 <a:ea typeface="微軟正黑體" panose="020B0604030504040204" pitchFamily="34" charset="-120"/>
               </a:rPr>
-              <a:t>程實驗</a:t>
+              <a:t>年</a:t>
+            </a:r>
+            <a:r>
+              <a:rPr lang="en-US" altLang="zh-TW" dirty="0">
+                <a:latin typeface="Consolas" panose="020B0609020204030204" pitchFamily="49" charset="0"/>
+                <a:ea typeface="微軟正黑體" panose="020B0604030504040204" pitchFamily="34" charset="-120"/>
+              </a:rPr>
+              <a:t>ICPC</a:t>
+            </a:r>
+            <a:r>
+              <a:rPr lang="zh-TW" altLang="en-US" dirty="0">
+                <a:latin typeface="Consolas" panose="020B0609020204030204" pitchFamily="49" charset="0"/>
+                <a:ea typeface="微軟正黑體" panose="020B0604030504040204" pitchFamily="34" charset="-120"/>
+              </a:rPr>
+              <a:t>選手</a:t>
             </a:r>
             <a:endParaRPr lang="en-US" altLang="zh-TW" dirty="0">
               <a:latin typeface="Consolas" panose="020B0609020204030204" pitchFamily="49" charset="0"/>
@@ -15787,60 +16501,26 @@
           </a:p>
           <a:p>
             <a:r>
-              <a:rPr lang="en-US" altLang="zh-TW" dirty="0">
-                <a:latin typeface="Consolas" panose="020B0609020204030204" pitchFamily="49" charset="0"/>
-                <a:ea typeface="微軟正黑體" panose="020B0604030504040204" pitchFamily="34" charset="-120"/>
-              </a:rPr>
-              <a:t>2021</a:t>
-            </a:r>
-            <a:r>
               <a:rPr lang="zh-TW" altLang="en-US" dirty="0">
                 <a:latin typeface="Consolas" panose="020B0609020204030204" pitchFamily="49" charset="0"/>
                 <a:ea typeface="微軟正黑體" panose="020B0604030504040204" pitchFamily="34" charset="-120"/>
               </a:rPr>
-              <a:t>年</a:t>
-            </a:r>
-            <a:r>
-              <a:rPr lang="en-US" altLang="zh-TW" dirty="0">
-                <a:latin typeface="Consolas" panose="020B0609020204030204" pitchFamily="49" charset="0"/>
-                <a:ea typeface="微軟正黑體" panose="020B0604030504040204" pitchFamily="34" charset="-120"/>
-              </a:rPr>
-              <a:t>ICPC</a:t>
+              <a:t>有自己的</a:t>
             </a:r>
             <a:r>
               <a:rPr lang="zh-TW" altLang="en-US" dirty="0">
                 <a:latin typeface="Consolas" panose="020B0609020204030204" pitchFamily="49" charset="0"/>
                 <a:ea typeface="微軟正黑體" panose="020B0604030504040204" pitchFamily="34" charset="-120"/>
-              </a:rPr>
-              <a:t>選手、</a:t>
-            </a:r>
-            <a:r>
-              <a:rPr lang="en-US" altLang="zh-TW" dirty="0">
-                <a:latin typeface="Consolas" panose="020B0609020204030204" pitchFamily="49" charset="0"/>
-                <a:ea typeface="微軟正黑體" panose="020B0604030504040204" pitchFamily="34" charset="-120"/>
-              </a:rPr>
-              <a:t>2022</a:t>
+                <a:hlinkClick r:id="rId4"/>
+              </a:rPr>
+              <a:t>部落格</a:t>
             </a:r>
             <a:r>
               <a:rPr lang="zh-TW" altLang="en-US" dirty="0">
                 <a:latin typeface="Consolas" panose="020B0609020204030204" pitchFamily="49" charset="0"/>
                 <a:ea typeface="微軟正黑體" panose="020B0604030504040204" pitchFamily="34" charset="-120"/>
               </a:rPr>
-              <a:t>年</a:t>
-            </a:r>
-            <a:r>
-              <a:rPr lang="en-US" altLang="zh-TW" dirty="0">
-                <a:latin typeface="Consolas" panose="020B0609020204030204" pitchFamily="49" charset="0"/>
-                <a:ea typeface="微軟正黑體" panose="020B0604030504040204" pitchFamily="34" charset="-120"/>
-              </a:rPr>
-              <a:t>ICPC</a:t>
-            </a:r>
-            <a:r>
-              <a:rPr lang="zh-TW" altLang="en-US" dirty="0">
-                <a:latin typeface="Consolas" panose="020B0609020204030204" pitchFamily="49" charset="0"/>
-                <a:ea typeface="微軟正黑體" panose="020B0604030504040204" pitchFamily="34" charset="-120"/>
-              </a:rPr>
-              <a:t>選手</a:t>
+              <a:t>，上面有各種稀奇古怪的研究</a:t>
             </a:r>
             <a:endParaRPr lang="en-US" altLang="zh-TW" dirty="0">
               <a:latin typeface="Consolas" panose="020B0609020204030204" pitchFamily="49" charset="0"/>
@@ -15853,56 +16533,28 @@
                 <a:latin typeface="Consolas" panose="020B0609020204030204" pitchFamily="49" charset="0"/>
                 <a:ea typeface="微軟正黑體" panose="020B0604030504040204" pitchFamily="34" charset="-120"/>
               </a:rPr>
-              <a:t>有自己的</a:t>
+              <a:t>還有頗完整的</a:t>
             </a:r>
             <a:r>
               <a:rPr lang="zh-TW" altLang="en-US" dirty="0">
                 <a:latin typeface="Consolas" panose="020B0609020204030204" pitchFamily="49" charset="0"/>
                 <a:ea typeface="微軟正黑體" panose="020B0604030504040204" pitchFamily="34" charset="-120"/>
-                <a:hlinkClick r:id="rId3"/>
-              </a:rPr>
-              <a:t>部落格</a:t>
+                <a:hlinkClick r:id="rId5"/>
+              </a:rPr>
+              <a:t>資工筆記</a:t>
             </a:r>
             <a:r>
               <a:rPr lang="zh-TW" altLang="en-US" dirty="0">
                 <a:latin typeface="Consolas" panose="020B0609020204030204" pitchFamily="49" charset="0"/>
                 <a:ea typeface="微軟正黑體" panose="020B0604030504040204" pitchFamily="34" charset="-120"/>
               </a:rPr>
-              <a:t>，上面有各種稀奇古怪的研究</a:t>
-            </a:r>
-            <a:endParaRPr lang="en-US" altLang="zh-TW" dirty="0">
-              <a:latin typeface="Consolas" panose="020B0609020204030204" pitchFamily="49" charset="0"/>
-              <a:ea typeface="微軟正黑體" panose="020B0604030504040204" pitchFamily="34" charset="-120"/>
-            </a:endParaRPr>
-          </a:p>
-          <a:p>
-            <a:r>
-              <a:rPr lang="zh-TW" altLang="en-US" dirty="0">
-                <a:latin typeface="Consolas" panose="020B0609020204030204" pitchFamily="49" charset="0"/>
-                <a:ea typeface="微軟正黑體" panose="020B0604030504040204" pitchFamily="34" charset="-120"/>
-              </a:rPr>
-              <a:t>還有頗完整的</a:t>
-            </a:r>
-            <a:r>
-              <a:rPr lang="zh-TW" altLang="en-US" dirty="0">
-                <a:latin typeface="Consolas" panose="020B0609020204030204" pitchFamily="49" charset="0"/>
-                <a:ea typeface="微軟正黑體" panose="020B0604030504040204" pitchFamily="34" charset="-120"/>
-                <a:hlinkClick r:id="rId4"/>
-              </a:rPr>
-              <a:t>資工筆記</a:t>
-            </a:r>
-            <a:r>
-              <a:rPr lang="zh-TW" altLang="en-US" dirty="0">
-                <a:latin typeface="Consolas" panose="020B0609020204030204" pitchFamily="49" charset="0"/>
-                <a:ea typeface="微軟正黑體" panose="020B0604030504040204" pitchFamily="34" charset="-120"/>
-              </a:rPr>
               <a:t>跟</a:t>
             </a:r>
             <a:r>
               <a:rPr lang="en-US" altLang="zh-TW" dirty="0" err="1">
                 <a:latin typeface="Consolas" panose="020B0609020204030204" pitchFamily="49" charset="0"/>
                 <a:ea typeface="微軟正黑體" panose="020B0604030504040204" pitchFamily="34" charset="-120"/>
-                <a:hlinkClick r:id="rId5"/>
+                <a:hlinkClick r:id="rId6"/>
               </a:rPr>
               <a:t>github</a:t>
             </a:r>
@@ -16677,7 +17329,7 @@
                 </a:solidFill>
                 <a:latin typeface="Consolas" panose="020B0609020204030204" pitchFamily="49" charset="0"/>
               </a:rPr>
-              <a:t>#define min(x, y) x&lt;y ? X:y</a:t>
+              <a:t>#define min(x, y) x&lt;y ? x:y</a:t>
             </a:r>
           </a:p>
           <a:p>
@@ -16688,8 +17340,121 @@
                 </a:solidFill>
                 <a:latin typeface="Consolas" panose="020B0609020204030204" pitchFamily="49" charset="0"/>
               </a:rPr>
-              <a:t>#define max(x, y) x&gt;y ? X:y</a:t>
-            </a:r>
+              <a:t>#define max(x, y) x&gt;y ? x:y</a:t>
+            </a:r>
+          </a:p>
+          <a:p>
+            <a:r>
+              <a:rPr lang="en-US" altLang="zh-TW" dirty="0" err="1">
+                <a:solidFill>
+                  <a:srgbClr val="DCDCCC"/>
+                </a:solidFill>
+                <a:latin typeface="Consolas" panose="020B0609020204030204" pitchFamily="49" charset="0"/>
+              </a:rPr>
+              <a:t>printf</a:t>
+            </a:r>
+            <a:r>
+              <a:rPr lang="en-US" altLang="zh-TW" b="1" dirty="0">
+                <a:solidFill>
+                  <a:srgbClr val="9F9D6D"/>
+                </a:solidFill>
+                <a:latin typeface="Consolas" panose="020B0609020204030204" pitchFamily="49" charset="0"/>
+              </a:rPr>
+              <a:t>(</a:t>
+            </a:r>
+            <a:r>
+              <a:rPr lang="en-US" altLang="zh-TW" b="0" dirty="0">
+                <a:solidFill>
+                  <a:srgbClr val="CC9393"/>
+                </a:solidFill>
+                <a:latin typeface="Consolas" panose="020B0609020204030204" pitchFamily="49" charset="0"/>
+              </a:rPr>
+              <a:t>"%d"</a:t>
+            </a:r>
+            <a:r>
+              <a:rPr lang="en-US" altLang="zh-TW" b="1" dirty="0">
+                <a:solidFill>
+                  <a:srgbClr val="9F9D6D"/>
+                </a:solidFill>
+                <a:latin typeface="Consolas" panose="020B0609020204030204" pitchFamily="49" charset="0"/>
+              </a:rPr>
+              <a:t>,</a:t>
+            </a:r>
+            <a:r>
+              <a:rPr lang="en-US" altLang="zh-TW" b="0" dirty="0">
+                <a:solidFill>
+                  <a:srgbClr val="DCDCCC"/>
+                </a:solidFill>
+                <a:latin typeface="Consolas" panose="020B0609020204030204" pitchFamily="49" charset="0"/>
+              </a:rPr>
+              <a:t> </a:t>
+            </a:r>
+            <a:r>
+              <a:rPr lang="en-US" altLang="zh-TW" b="0">
+                <a:solidFill>
+                  <a:srgbClr val="DCDCCC"/>
+                </a:solidFill>
+                <a:latin typeface="Consolas" panose="020B0609020204030204" pitchFamily="49" charset="0"/>
+              </a:rPr>
+              <a:t>min</a:t>
+            </a:r>
+            <a:r>
+              <a:rPr lang="en-US" altLang="zh-TW" b="1">
+                <a:solidFill>
+                  <a:srgbClr val="9F9D6D"/>
+                </a:solidFill>
+                <a:latin typeface="Consolas" panose="020B0609020204030204" pitchFamily="49" charset="0"/>
+              </a:rPr>
+              <a:t>(</a:t>
+            </a:r>
+            <a:r>
+              <a:rPr lang="en-US" altLang="zh-TW">
+                <a:solidFill>
+                  <a:srgbClr val="DCDCCC"/>
+                </a:solidFill>
+                <a:latin typeface="Consolas" panose="020B0609020204030204" pitchFamily="49" charset="0"/>
+              </a:rPr>
+              <a:t>a</a:t>
+            </a:r>
+            <a:r>
+              <a:rPr lang="en-US" altLang="zh-TW" b="1">
+                <a:solidFill>
+                  <a:srgbClr val="9F9D6D"/>
+                </a:solidFill>
+                <a:latin typeface="Consolas" panose="020B0609020204030204" pitchFamily="49" charset="0"/>
+              </a:rPr>
+              <a:t>,</a:t>
+            </a:r>
+            <a:r>
+              <a:rPr lang="en-US" altLang="zh-TW" b="0">
+                <a:solidFill>
+                  <a:srgbClr val="DCDCCC"/>
+                </a:solidFill>
+                <a:latin typeface="Consolas" panose="020B0609020204030204" pitchFamily="49" charset="0"/>
+              </a:rPr>
+              <a:t> </a:t>
+            </a:r>
+            <a:r>
+              <a:rPr lang="en-US" altLang="zh-TW">
+                <a:solidFill>
+                  <a:srgbClr val="DCDCCC"/>
+                </a:solidFill>
+                <a:latin typeface="Consolas" panose="020B0609020204030204" pitchFamily="49" charset="0"/>
+              </a:rPr>
+              <a:t>b</a:t>
+            </a:r>
+            <a:r>
+              <a:rPr lang="en-US" altLang="zh-TW" b="1">
+                <a:solidFill>
+                  <a:srgbClr val="9F9D6D"/>
+                </a:solidFill>
+                <a:latin typeface="Consolas" panose="020B0609020204030204" pitchFamily="49" charset="0"/>
+              </a:rPr>
+              <a:t>));</a:t>
+            </a:r>
+            <a:endParaRPr lang="es-ES" altLang="zh-TW" sz="4000" dirty="0">
+              <a:latin typeface="Consolas" panose="020B0609020204030204" pitchFamily="49" charset="0"/>
+            </a:endParaRPr>
           </a:p>
           <a:p>
             <a:endParaRPr lang="en-US" altLang="zh-TW" dirty="0">
@@ -25428,7 +26193,7 @@
         </p:blipFill>
         <p:spPr>
           <a:xfrm>
-            <a:off x="2034826" y="1660489"/>
+            <a:off x="2034826" y="1690688"/>
             <a:ext cx="8122347" cy="3537022"/>
           </a:xfrm>
           <a:prstGeom prst="rect">
@@ -25436,6 +26201,42 @@
           </a:prstGeom>
         </p:spPr>
       </p:pic>
+      <p:sp>
+        <p:nvSpPr>
+          <p:cNvPr id="2" name="標題 1">
+            <a:extLst>
+              <a:ext uri="{FF2B5EF4-FFF2-40B4-BE49-F238E27FC236}">
+                <a16:creationId xmlns:a16="http://schemas.microsoft.com/office/drawing/2014/main" id="{5206F360-CCB9-656E-E665-15CFECD2ECE5}"/>
+              </a:ext>
+            </a:extLst>
+          </p:cNvPr>
+          <p:cNvSpPr>
+            <a:spLocks noGrp="1"/>
+          </p:cNvSpPr>
+          <p:nvPr>
+            <p:ph type="title"/>
+          </p:nvPr>
+        </p:nvSpPr>
+        <p:spPr>
+          <a:xfrm>
+            <a:off x="838200" y="365125"/>
+            <a:ext cx="10515600" cy="1325563"/>
+          </a:xfrm>
+        </p:spPr>
+        <p:txBody>
+          <a:bodyPr/>
+          <a:lstStyle/>
+          <a:p>
+            <a:r>
+              <a:rPr lang="zh-TW" altLang="en-US" dirty="0">
+                <a:latin typeface="微軟正黑體" panose="020B0604030504040204" pitchFamily="34" charset="-120"/>
+                <a:ea typeface="微軟正黑體" panose="020B0604030504040204" pitchFamily="34" charset="-120"/>
+              </a:rPr>
+              <a:t>前言</a:t>
+            </a:r>
+          </a:p>
+        </p:txBody>
+      </p:sp>
     </p:spTree>
     <p:extLst>
       <p:ext uri="{BB962C8B-B14F-4D97-AF65-F5344CB8AC3E}">

</xml_diff>

<commit_message>
update Ch2 & Ch1 & Ch3
</commit_message>
<xml_diff>
--- a/Ch1/Ch1-basic.pptx
+++ b/Ch1/Ch1-basic.pptx
@@ -308,7 +308,7 @@
           <a:p>
             <a:fld id="{5CA1DE25-5FDD-4627-8F1B-8C59CC04B9FE}" type="datetimeFigureOut">
               <a:rPr lang="zh-TW" altLang="en-US" smtClean="0"/>
-              <a:t>2022/11/17</a:t>
+              <a:t>2022/11/23</a:t>
             </a:fld>
             <a:endParaRPr lang="zh-TW" altLang="en-US"/>
           </a:p>
@@ -3370,7 +3370,7 @@
           <a:p>
             <a:fld id="{ABB345C4-D81E-4C8D-86A1-B639E123A710}" type="datetimeFigureOut">
               <a:rPr lang="zh-TW" altLang="en-US" smtClean="0"/>
-              <a:t>2022/11/17</a:t>
+              <a:t>2022/11/23</a:t>
             </a:fld>
             <a:endParaRPr lang="zh-TW" altLang="en-US"/>
           </a:p>
@@ -3540,7 +3540,7 @@
           <a:p>
             <a:fld id="{ABB345C4-D81E-4C8D-86A1-B639E123A710}" type="datetimeFigureOut">
               <a:rPr lang="zh-TW" altLang="en-US" smtClean="0"/>
-              <a:t>2022/11/17</a:t>
+              <a:t>2022/11/23</a:t>
             </a:fld>
             <a:endParaRPr lang="zh-TW" altLang="en-US"/>
           </a:p>
@@ -3720,7 +3720,7 @@
           <a:p>
             <a:fld id="{ABB345C4-D81E-4C8D-86A1-B639E123A710}" type="datetimeFigureOut">
               <a:rPr lang="zh-TW" altLang="en-US" smtClean="0"/>
-              <a:t>2022/11/17</a:t>
+              <a:t>2022/11/23</a:t>
             </a:fld>
             <a:endParaRPr lang="zh-TW" altLang="en-US"/>
           </a:p>
@@ -3890,7 +3890,7 @@
           <a:p>
             <a:fld id="{ABB345C4-D81E-4C8D-86A1-B639E123A710}" type="datetimeFigureOut">
               <a:rPr lang="zh-TW" altLang="en-US" smtClean="0"/>
-              <a:t>2022/11/17</a:t>
+              <a:t>2022/11/23</a:t>
             </a:fld>
             <a:endParaRPr lang="zh-TW" altLang="en-US"/>
           </a:p>
@@ -4136,7 +4136,7 @@
           <a:p>
             <a:fld id="{ABB345C4-D81E-4C8D-86A1-B639E123A710}" type="datetimeFigureOut">
               <a:rPr lang="zh-TW" altLang="en-US" smtClean="0"/>
-              <a:t>2022/11/17</a:t>
+              <a:t>2022/11/23</a:t>
             </a:fld>
             <a:endParaRPr lang="zh-TW" altLang="en-US"/>
           </a:p>
@@ -4368,7 +4368,7 @@
           <a:p>
             <a:fld id="{ABB345C4-D81E-4C8D-86A1-B639E123A710}" type="datetimeFigureOut">
               <a:rPr lang="zh-TW" altLang="en-US" smtClean="0"/>
-              <a:t>2022/11/17</a:t>
+              <a:t>2022/11/23</a:t>
             </a:fld>
             <a:endParaRPr lang="zh-TW" altLang="en-US"/>
           </a:p>
@@ -4735,7 +4735,7 @@
           <a:p>
             <a:fld id="{ABB345C4-D81E-4C8D-86A1-B639E123A710}" type="datetimeFigureOut">
               <a:rPr lang="zh-TW" altLang="en-US" smtClean="0"/>
-              <a:t>2022/11/17</a:t>
+              <a:t>2022/11/23</a:t>
             </a:fld>
             <a:endParaRPr lang="zh-TW" altLang="en-US"/>
           </a:p>
@@ -4853,7 +4853,7 @@
           <a:p>
             <a:fld id="{ABB345C4-D81E-4C8D-86A1-B639E123A710}" type="datetimeFigureOut">
               <a:rPr lang="zh-TW" altLang="en-US" smtClean="0"/>
-              <a:t>2022/11/17</a:t>
+              <a:t>2022/11/23</a:t>
             </a:fld>
             <a:endParaRPr lang="zh-TW" altLang="en-US"/>
           </a:p>
@@ -4948,7 +4948,7 @@
           <a:p>
             <a:fld id="{ABB345C4-D81E-4C8D-86A1-B639E123A710}" type="datetimeFigureOut">
               <a:rPr lang="zh-TW" altLang="en-US" smtClean="0"/>
-              <a:t>2022/11/17</a:t>
+              <a:t>2022/11/23</a:t>
             </a:fld>
             <a:endParaRPr lang="zh-TW" altLang="en-US"/>
           </a:p>
@@ -5225,7 +5225,7 @@
           <a:p>
             <a:fld id="{ABB345C4-D81E-4C8D-86A1-B639E123A710}" type="datetimeFigureOut">
               <a:rPr lang="zh-TW" altLang="en-US" smtClean="0"/>
-              <a:t>2022/11/17</a:t>
+              <a:t>2022/11/23</a:t>
             </a:fld>
             <a:endParaRPr lang="zh-TW" altLang="en-US"/>
           </a:p>
@@ -5482,7 +5482,7 @@
           <a:p>
             <a:fld id="{ABB345C4-D81E-4C8D-86A1-B639E123A710}" type="datetimeFigureOut">
               <a:rPr lang="zh-TW" altLang="en-US" smtClean="0"/>
-              <a:t>2022/11/17</a:t>
+              <a:t>2022/11/23</a:t>
             </a:fld>
             <a:endParaRPr lang="zh-TW" altLang="en-US"/>
           </a:p>
@@ -5695,7 +5695,7 @@
           <a:p>
             <a:fld id="{ABB345C4-D81E-4C8D-86A1-B639E123A710}" type="datetimeFigureOut">
               <a:rPr lang="zh-TW" altLang="en-US" smtClean="0"/>
-              <a:t>2022/11/17</a:t>
+              <a:t>2022/11/23</a:t>
             </a:fld>
             <a:endParaRPr lang="zh-TW" altLang="en-US"/>
           </a:p>
@@ -6140,8 +6140,19 @@
                 <a:latin typeface="Consolas" panose="020B0609020204030204" pitchFamily="49" charset="0"/>
                 <a:ea typeface="微軟正黑體" panose="020B0604030504040204" pitchFamily="34" charset="-120"/>
               </a:rPr>
-              <a:t>程不教的東西</a:t>
-            </a:r>
+              <a:t>程不</a:t>
+            </a:r>
+            <a:r>
+              <a:rPr lang="zh-TW" altLang="en-US">
+                <a:latin typeface="Consolas" panose="020B0609020204030204" pitchFamily="49" charset="0"/>
+                <a:ea typeface="微軟正黑體" panose="020B0604030504040204" pitchFamily="34" charset="-120"/>
+              </a:rPr>
+              <a:t>教的事</a:t>
+            </a:r>
+            <a:endParaRPr lang="zh-TW" altLang="en-US" dirty="0">
+              <a:latin typeface="Consolas" panose="020B0609020204030204" pitchFamily="49" charset="0"/>
+              <a:ea typeface="微軟正黑體" panose="020B0604030504040204" pitchFamily="34" charset="-120"/>
+            </a:endParaRPr>
           </a:p>
         </p:txBody>
       </p:sp>

</xml_diff>